<commit_message>
Final Set of Slides
</commit_message>
<xml_diff>
--- a/1. Introduction to Program .pptx
+++ b/1. Introduction to Program .pptx
@@ -138,6 +138,11 @@
             <a:srgbClr val="F26B43"/>
           </p15:clr>
         </p15:guide>
+        <p15:guide id="9" orient="horz" pos="3768" userDrawn="1">
+          <p15:clr>
+            <a:srgbClr val="F26B43"/>
+          </p15:clr>
+        </p15:guide>
       </p15:sldGuideLst>
     </p:ext>
   </p:extLst>
@@ -291,7 +296,7 @@
           <a:p>
             <a:fld id="{0BE01D5E-C7B1-4D60-A0D5-546CE74E20BC}" type="datetimeFigureOut">
               <a:rPr lang="en-US" smtClean="0"/>
-              <a:t>4/19/2022</a:t>
+              <a:t>4/20/2022</a:t>
             </a:fld>
             <a:endParaRPr lang="en-US"/>
           </a:p>
@@ -489,7 +494,7 @@
           <a:p>
             <a:fld id="{0BE01D5E-C7B1-4D60-A0D5-546CE74E20BC}" type="datetimeFigureOut">
               <a:rPr lang="en-US" smtClean="0"/>
-              <a:t>4/19/2022</a:t>
+              <a:t>4/20/2022</a:t>
             </a:fld>
             <a:endParaRPr lang="en-US"/>
           </a:p>
@@ -697,7 +702,7 @@
           <a:p>
             <a:fld id="{0BE01D5E-C7B1-4D60-A0D5-546CE74E20BC}" type="datetimeFigureOut">
               <a:rPr lang="en-US" smtClean="0"/>
-              <a:t>4/19/2022</a:t>
+              <a:t>4/20/2022</a:t>
             </a:fld>
             <a:endParaRPr lang="en-US"/>
           </a:p>
@@ -895,7 +900,7 @@
           <a:p>
             <a:fld id="{0BE01D5E-C7B1-4D60-A0D5-546CE74E20BC}" type="datetimeFigureOut">
               <a:rPr lang="en-US" smtClean="0"/>
-              <a:t>4/19/2022</a:t>
+              <a:t>4/20/2022</a:t>
             </a:fld>
             <a:endParaRPr lang="en-US"/>
           </a:p>
@@ -1170,7 +1175,7 @@
           <a:p>
             <a:fld id="{0BE01D5E-C7B1-4D60-A0D5-546CE74E20BC}" type="datetimeFigureOut">
               <a:rPr lang="en-US" smtClean="0"/>
-              <a:t>4/19/2022</a:t>
+              <a:t>4/20/2022</a:t>
             </a:fld>
             <a:endParaRPr lang="en-US"/>
           </a:p>
@@ -1435,7 +1440,7 @@
           <a:p>
             <a:fld id="{0BE01D5E-C7B1-4D60-A0D5-546CE74E20BC}" type="datetimeFigureOut">
               <a:rPr lang="en-US" smtClean="0"/>
-              <a:t>4/19/2022</a:t>
+              <a:t>4/20/2022</a:t>
             </a:fld>
             <a:endParaRPr lang="en-US"/>
           </a:p>
@@ -1847,7 +1852,7 @@
           <a:p>
             <a:fld id="{0BE01D5E-C7B1-4D60-A0D5-546CE74E20BC}" type="datetimeFigureOut">
               <a:rPr lang="en-US" smtClean="0"/>
-              <a:t>4/19/2022</a:t>
+              <a:t>4/20/2022</a:t>
             </a:fld>
             <a:endParaRPr lang="en-US"/>
           </a:p>
@@ -1988,7 +1993,7 @@
           <a:p>
             <a:fld id="{0BE01D5E-C7B1-4D60-A0D5-546CE74E20BC}" type="datetimeFigureOut">
               <a:rPr lang="en-US" smtClean="0"/>
-              <a:t>4/19/2022</a:t>
+              <a:t>4/20/2022</a:t>
             </a:fld>
             <a:endParaRPr lang="en-US"/>
           </a:p>
@@ -2101,7 +2106,7 @@
           <a:p>
             <a:fld id="{0BE01D5E-C7B1-4D60-A0D5-546CE74E20BC}" type="datetimeFigureOut">
               <a:rPr lang="en-US" smtClean="0"/>
-              <a:t>4/19/2022</a:t>
+              <a:t>4/20/2022</a:t>
             </a:fld>
             <a:endParaRPr lang="en-US"/>
           </a:p>
@@ -2412,7 +2417,7 @@
           <a:p>
             <a:fld id="{0BE01D5E-C7B1-4D60-A0D5-546CE74E20BC}" type="datetimeFigureOut">
               <a:rPr lang="en-US" smtClean="0"/>
-              <a:t>4/19/2022</a:t>
+              <a:t>4/20/2022</a:t>
             </a:fld>
             <a:endParaRPr lang="en-US"/>
           </a:p>
@@ -2700,7 +2705,7 @@
           <a:p>
             <a:fld id="{0BE01D5E-C7B1-4D60-A0D5-546CE74E20BC}" type="datetimeFigureOut">
               <a:rPr lang="en-US" smtClean="0"/>
-              <a:t>4/19/2022</a:t>
+              <a:t>4/20/2022</a:t>
             </a:fld>
             <a:endParaRPr lang="en-US"/>
           </a:p>
@@ -2941,7 +2946,7 @@
           <a:p>
             <a:fld id="{0BE01D5E-C7B1-4D60-A0D5-546CE74E20BC}" type="datetimeFigureOut">
               <a:rPr lang="en-US" smtClean="0"/>
-              <a:t>4/19/2022</a:t>
+              <a:t>4/20/2022</a:t>
             </a:fld>
             <a:endParaRPr lang="en-US"/>
           </a:p>
@@ -3448,7 +3453,7 @@
         <p:spPr>
           <a:xfrm>
             <a:off x="4153962" y="3238977"/>
-            <a:ext cx="4387098" cy="369332"/>
+            <a:ext cx="1414875" cy="369332"/>
           </a:xfrm>
           <a:prstGeom prst="rect">
             <a:avLst/>
@@ -3463,7 +3468,7 @@
           <a:p>
             <a:r>
               <a:rPr lang="en-US" b="1" dirty="0"/>
-              <a:t>AUTHOR, TRAINER AND PROUD DEVELOPER</a:t>
+              <a:t>INSTRUCTOR</a:t>
             </a:r>
           </a:p>
         </p:txBody>
@@ -3797,7 +3802,7 @@
                                     <p:cond delay="1000"/>
                                   </p:stCondLst>
                                   <p:childTnLst>
-                                    <p:animMotion origin="layout" path="M -2.91667E-6 -4.07407E-6 L -0.13307 0.37593 " pathEditMode="relative" rAng="0" ptsTypes="AA">
+                                    <p:animMotion origin="layout" path="M 2.08333E-6 -4.07407E-6 L -0.09089 0.37315 " pathEditMode="relative" rAng="0" ptsTypes="AA">
                                       <p:cBhvr>
                                         <p:cTn id="21" dur="2000" fill="hold"/>
                                         <p:tgtEl>
@@ -3808,7 +3813,7 @@
                                           <p:attrName>ppt_y</p:attrName>
                                         </p:attrNameLst>
                                       </p:cBhvr>
-                                      <p:rCtr x="-6654" y="18796"/>
+                                      <p:rCtr x="-4544" y="18657"/>
                                     </p:animMotion>
                                   </p:childTnLst>
                                 </p:cTn>

</xml_diff>

<commit_message>
Coding for Kids Slides updated with Assignment and Practice Assignments
</commit_message>
<xml_diff>
--- a/1. Introduction to Program .pptx
+++ b/1. Introduction to Program .pptx
@@ -12,11 +12,13 @@
     <p:sldId id="264" r:id="rId6"/>
     <p:sldId id="266" r:id="rId7"/>
     <p:sldId id="265" r:id="rId8"/>
-    <p:sldId id="269" r:id="rId9"/>
-    <p:sldId id="270" r:id="rId10"/>
-    <p:sldId id="271" r:id="rId11"/>
-    <p:sldId id="272" r:id="rId12"/>
-    <p:sldId id="273" r:id="rId13"/>
+    <p:sldId id="274" r:id="rId9"/>
+    <p:sldId id="275" r:id="rId10"/>
+    <p:sldId id="269" r:id="rId11"/>
+    <p:sldId id="270" r:id="rId12"/>
+    <p:sldId id="271" r:id="rId13"/>
+    <p:sldId id="272" r:id="rId14"/>
+    <p:sldId id="273" r:id="rId15"/>
   </p:sldIdLst>
   <p:sldSz cx="12192000" cy="6858000"/>
   <p:notesSz cx="6858000" cy="9144000"/>
@@ -296,7 +298,7 @@
           <a:p>
             <a:fld id="{0BE01D5E-C7B1-4D60-A0D5-546CE74E20BC}" type="datetimeFigureOut">
               <a:rPr lang="en-US" smtClean="0"/>
-              <a:t>4/20/2022</a:t>
+              <a:t>4/21/2022</a:t>
             </a:fld>
             <a:endParaRPr lang="en-US"/>
           </a:p>
@@ -494,7 +496,7 @@
           <a:p>
             <a:fld id="{0BE01D5E-C7B1-4D60-A0D5-546CE74E20BC}" type="datetimeFigureOut">
               <a:rPr lang="en-US" smtClean="0"/>
-              <a:t>4/20/2022</a:t>
+              <a:t>4/21/2022</a:t>
             </a:fld>
             <a:endParaRPr lang="en-US"/>
           </a:p>
@@ -702,7 +704,7 @@
           <a:p>
             <a:fld id="{0BE01D5E-C7B1-4D60-A0D5-546CE74E20BC}" type="datetimeFigureOut">
               <a:rPr lang="en-US" smtClean="0"/>
-              <a:t>4/20/2022</a:t>
+              <a:t>4/21/2022</a:t>
             </a:fld>
             <a:endParaRPr lang="en-US"/>
           </a:p>
@@ -900,7 +902,7 @@
           <a:p>
             <a:fld id="{0BE01D5E-C7B1-4D60-A0D5-546CE74E20BC}" type="datetimeFigureOut">
               <a:rPr lang="en-US" smtClean="0"/>
-              <a:t>4/20/2022</a:t>
+              <a:t>4/21/2022</a:t>
             </a:fld>
             <a:endParaRPr lang="en-US"/>
           </a:p>
@@ -1175,7 +1177,7 @@
           <a:p>
             <a:fld id="{0BE01D5E-C7B1-4D60-A0D5-546CE74E20BC}" type="datetimeFigureOut">
               <a:rPr lang="en-US" smtClean="0"/>
-              <a:t>4/20/2022</a:t>
+              <a:t>4/21/2022</a:t>
             </a:fld>
             <a:endParaRPr lang="en-US"/>
           </a:p>
@@ -1440,7 +1442,7 @@
           <a:p>
             <a:fld id="{0BE01D5E-C7B1-4D60-A0D5-546CE74E20BC}" type="datetimeFigureOut">
               <a:rPr lang="en-US" smtClean="0"/>
-              <a:t>4/20/2022</a:t>
+              <a:t>4/21/2022</a:t>
             </a:fld>
             <a:endParaRPr lang="en-US"/>
           </a:p>
@@ -1852,7 +1854,7 @@
           <a:p>
             <a:fld id="{0BE01D5E-C7B1-4D60-A0D5-546CE74E20BC}" type="datetimeFigureOut">
               <a:rPr lang="en-US" smtClean="0"/>
-              <a:t>4/20/2022</a:t>
+              <a:t>4/21/2022</a:t>
             </a:fld>
             <a:endParaRPr lang="en-US"/>
           </a:p>
@@ -1993,7 +1995,7 @@
           <a:p>
             <a:fld id="{0BE01D5E-C7B1-4D60-A0D5-546CE74E20BC}" type="datetimeFigureOut">
               <a:rPr lang="en-US" smtClean="0"/>
-              <a:t>4/20/2022</a:t>
+              <a:t>4/21/2022</a:t>
             </a:fld>
             <a:endParaRPr lang="en-US"/>
           </a:p>
@@ -2106,7 +2108,7 @@
           <a:p>
             <a:fld id="{0BE01D5E-C7B1-4D60-A0D5-546CE74E20BC}" type="datetimeFigureOut">
               <a:rPr lang="en-US" smtClean="0"/>
-              <a:t>4/20/2022</a:t>
+              <a:t>4/21/2022</a:t>
             </a:fld>
             <a:endParaRPr lang="en-US"/>
           </a:p>
@@ -2417,7 +2419,7 @@
           <a:p>
             <a:fld id="{0BE01D5E-C7B1-4D60-A0D5-546CE74E20BC}" type="datetimeFigureOut">
               <a:rPr lang="en-US" smtClean="0"/>
-              <a:t>4/20/2022</a:t>
+              <a:t>4/21/2022</a:t>
             </a:fld>
             <a:endParaRPr lang="en-US"/>
           </a:p>
@@ -2705,7 +2707,7 @@
           <a:p>
             <a:fld id="{0BE01D5E-C7B1-4D60-A0D5-546CE74E20BC}" type="datetimeFigureOut">
               <a:rPr lang="en-US" smtClean="0"/>
-              <a:t>4/20/2022</a:t>
+              <a:t>4/21/2022</a:t>
             </a:fld>
             <a:endParaRPr lang="en-US"/>
           </a:p>
@@ -2946,7 +2948,7 @@
           <a:p>
             <a:fld id="{0BE01D5E-C7B1-4D60-A0D5-546CE74E20BC}" type="datetimeFigureOut">
               <a:rPr lang="en-US" smtClean="0"/>
-              <a:t>4/20/2022</a:t>
+              <a:t>4/21/2022</a:t>
             </a:fld>
             <a:endParaRPr lang="en-US"/>
           </a:p>
@@ -4143,8 +4145,8 @@
         </p:blipFill>
         <p:spPr>
           <a:xfrm>
-            <a:off x="10030691" y="2937164"/>
-            <a:ext cx="1458664" cy="1458664"/>
+            <a:off x="8707582" y="2495853"/>
+            <a:ext cx="2509575" cy="2509575"/>
           </a:xfrm>
           <a:prstGeom prst="rect">
             <a:avLst/>
@@ -4187,12 +4189,92 @@
           </a:prstGeom>
         </p:spPr>
       </p:pic>
+      <p:cxnSp>
+        <p:nvCxnSpPr>
+          <p:cNvPr id="8" name="Straight Arrow Connector 7">
+            <a:extLst>
+              <a:ext uri="{FF2B5EF4-FFF2-40B4-BE49-F238E27FC236}">
+                <a16:creationId xmlns:a16="http://schemas.microsoft.com/office/drawing/2014/main" id="{93CDEECC-1BA2-4107-A867-6A6A3FF92D31}"/>
+              </a:ext>
+            </a:extLst>
+          </p:cNvPr>
+          <p:cNvCxnSpPr>
+            <a:cxnSpLocks/>
+          </p:cNvCxnSpPr>
+          <p:nvPr/>
+        </p:nvCxnSpPr>
+        <p:spPr>
+          <a:xfrm>
+            <a:off x="3484419" y="3546764"/>
+            <a:ext cx="4509654" cy="0"/>
+          </a:xfrm>
+          <a:prstGeom prst="straightConnector1">
+            <a:avLst/>
+          </a:prstGeom>
+          <a:ln w="76200">
+            <a:solidFill>
+              <a:schemeClr val="tx1"/>
+            </a:solidFill>
+            <a:prstDash val="dash"/>
+            <a:tailEnd type="triangle"/>
+          </a:ln>
+        </p:spPr>
+        <p:style>
+          <a:lnRef idx="1">
+            <a:schemeClr val="dk1"/>
+          </a:lnRef>
+          <a:fillRef idx="0">
+            <a:schemeClr val="dk1"/>
+          </a:fillRef>
+          <a:effectRef idx="0">
+            <a:schemeClr val="dk1"/>
+          </a:effectRef>
+          <a:fontRef idx="minor">
+            <a:schemeClr val="tx1"/>
+          </a:fontRef>
+        </p:style>
+      </p:cxnSp>
+      <p:sp>
+        <p:nvSpPr>
+          <p:cNvPr id="12" name="TextBox 11">
+            <a:extLst>
+              <a:ext uri="{FF2B5EF4-FFF2-40B4-BE49-F238E27FC236}">
+                <a16:creationId xmlns:a16="http://schemas.microsoft.com/office/drawing/2014/main" id="{94420BDD-3CDA-475B-96C7-13A37E2B22CB}"/>
+              </a:ext>
+            </a:extLst>
+          </p:cNvPr>
+          <p:cNvSpPr txBox="1"/>
+          <p:nvPr/>
+        </p:nvSpPr>
+        <p:spPr>
+          <a:xfrm>
+            <a:off x="5043055" y="3059668"/>
+            <a:ext cx="1856509" cy="369332"/>
+          </a:xfrm>
+          <a:prstGeom prst="rect">
+            <a:avLst/>
+          </a:prstGeom>
+          <a:noFill/>
+        </p:spPr>
+        <p:txBody>
+          <a:bodyPr wrap="square" rtlCol="0">
+            <a:spAutoFit/>
+          </a:bodyPr>
+          <a:lstStyle/>
+          <a:p>
+            <a:r>
+              <a:rPr lang="en-US" b="1" dirty="0"/>
+              <a:t>Instruction/Code</a:t>
+            </a:r>
+          </a:p>
+        </p:txBody>
+      </p:sp>
       <p:grpSp>
         <p:nvGrpSpPr>
-          <p:cNvPr id="2" name="Group 1">
-            <a:extLst>
-              <a:ext uri="{FF2B5EF4-FFF2-40B4-BE49-F238E27FC236}">
-                <a16:creationId xmlns:a16="http://schemas.microsoft.com/office/drawing/2014/main" id="{87D83FFC-BBDF-4E11-89BF-EC537600ADD1}"/>
+          <p:cNvPr id="13" name="Group 12">
+            <a:extLst>
+              <a:ext uri="{FF2B5EF4-FFF2-40B4-BE49-F238E27FC236}">
+                <a16:creationId xmlns:a16="http://schemas.microsoft.com/office/drawing/2014/main" id="{CD4B1333-4D4A-4050-8534-F7DB2E1D15F1}"/>
               </a:ext>
             </a:extLst>
           </p:cNvPr>
@@ -4201,111 +4283,10 @@
         </p:nvGrpSpPr>
         <p:grpSpPr>
           <a:xfrm>
-            <a:off x="3484419" y="3059668"/>
-            <a:ext cx="4509654" cy="487096"/>
-            <a:chOff x="3484419" y="3059668"/>
-            <a:chExt cx="4509654" cy="487096"/>
-          </a:xfrm>
-        </p:grpSpPr>
-        <p:cxnSp>
-          <p:nvCxnSpPr>
-            <p:cNvPr id="8" name="Straight Arrow Connector 7">
-              <a:extLst>
-                <a:ext uri="{FF2B5EF4-FFF2-40B4-BE49-F238E27FC236}">
-                  <a16:creationId xmlns:a16="http://schemas.microsoft.com/office/drawing/2014/main" id="{93CDEECC-1BA2-4107-A867-6A6A3FF92D31}"/>
-                </a:ext>
-              </a:extLst>
-            </p:cNvPr>
-            <p:cNvCxnSpPr>
-              <a:cxnSpLocks/>
-            </p:cNvCxnSpPr>
-            <p:nvPr/>
-          </p:nvCxnSpPr>
-          <p:spPr>
-            <a:xfrm>
-              <a:off x="3484419" y="3546764"/>
-              <a:ext cx="4509654" cy="0"/>
-            </a:xfrm>
-            <a:prstGeom prst="straightConnector1">
-              <a:avLst/>
-            </a:prstGeom>
-            <a:ln w="76200">
-              <a:solidFill>
-                <a:schemeClr val="tx1"/>
-              </a:solidFill>
-              <a:prstDash val="dash"/>
-              <a:tailEnd type="triangle"/>
-            </a:ln>
-          </p:spPr>
-          <p:style>
-            <a:lnRef idx="1">
-              <a:schemeClr val="dk1"/>
-            </a:lnRef>
-            <a:fillRef idx="0">
-              <a:schemeClr val="dk1"/>
-            </a:fillRef>
-            <a:effectRef idx="0">
-              <a:schemeClr val="dk1"/>
-            </a:effectRef>
-            <a:fontRef idx="minor">
-              <a:schemeClr val="tx1"/>
-            </a:fontRef>
-          </p:style>
-        </p:cxnSp>
-        <p:sp>
-          <p:nvSpPr>
-            <p:cNvPr id="12" name="TextBox 11">
-              <a:extLst>
-                <a:ext uri="{FF2B5EF4-FFF2-40B4-BE49-F238E27FC236}">
-                  <a16:creationId xmlns:a16="http://schemas.microsoft.com/office/drawing/2014/main" id="{94420BDD-3CDA-475B-96C7-13A37E2B22CB}"/>
-                </a:ext>
-              </a:extLst>
-            </p:cNvPr>
-            <p:cNvSpPr txBox="1"/>
-            <p:nvPr/>
-          </p:nvSpPr>
-          <p:spPr>
-            <a:xfrm>
-              <a:off x="5043055" y="3059668"/>
-              <a:ext cx="1856509" cy="369332"/>
-            </a:xfrm>
-            <a:prstGeom prst="rect">
-              <a:avLst/>
-            </a:prstGeom>
-            <a:noFill/>
-          </p:spPr>
-          <p:txBody>
-            <a:bodyPr wrap="square" rtlCol="0">
-              <a:spAutoFit/>
-            </a:bodyPr>
-            <a:lstStyle/>
-            <a:p>
-              <a:r>
-                <a:rPr lang="en-US" b="1" dirty="0"/>
-                <a:t>Instruction/Code</a:t>
-              </a:r>
-            </a:p>
-          </p:txBody>
-        </p:sp>
-      </p:grpSp>
-      <p:grpSp>
-        <p:nvGrpSpPr>
-          <p:cNvPr id="13" name="Group 12">
-            <a:extLst>
-              <a:ext uri="{FF2B5EF4-FFF2-40B4-BE49-F238E27FC236}">
-                <a16:creationId xmlns:a16="http://schemas.microsoft.com/office/drawing/2014/main" id="{CD4B1333-4D4A-4050-8534-F7DB2E1D15F1}"/>
-              </a:ext>
-            </a:extLst>
-          </p:cNvPr>
-          <p:cNvGrpSpPr/>
-          <p:nvPr/>
-        </p:nvGrpSpPr>
-        <p:grpSpPr>
-          <a:xfrm>
-            <a:off x="1918407" y="5771670"/>
-            <a:ext cx="8640525" cy="745675"/>
+            <a:off x="3646951" y="5562851"/>
+            <a:ext cx="4862945" cy="568020"/>
             <a:chOff x="3646951" y="5562851"/>
-            <a:chExt cx="4862945" cy="745675"/>
+            <a:chExt cx="4862945" cy="568020"/>
           </a:xfrm>
         </p:grpSpPr>
         <p:sp>
@@ -4371,8 +4352,8 @@
           </p:nvSpPr>
           <p:spPr>
             <a:xfrm>
-              <a:off x="3847564" y="5662195"/>
-              <a:ext cx="4503783" cy="646331"/>
+              <a:off x="3819639" y="5681600"/>
+              <a:ext cx="4513608" cy="369332"/>
             </a:xfrm>
             <a:prstGeom prst="rect">
               <a:avLst/>
@@ -4380,195 +4361,23 @@
             <a:noFill/>
           </p:spPr>
           <p:txBody>
-            <a:bodyPr wrap="square" rtlCol="0">
+            <a:bodyPr wrap="none" rtlCol="0">
               <a:spAutoFit/>
             </a:bodyPr>
             <a:lstStyle/>
             <a:p>
               <a:r>
-                <a:rPr lang="en-US" dirty="0">
-                  <a:latin typeface="open sans" panose="020B0606030504020204" pitchFamily="34" charset="0"/>
-                  <a:ea typeface="open sans" panose="020B0606030504020204" pitchFamily="34" charset="0"/>
-                  <a:cs typeface="open sans" panose="020B0606030504020204" pitchFamily="34" charset="0"/>
-                </a:rPr>
-                <a:t>A translator comes in to explain what user is saying in machine language</a:t>
+                <a:rPr lang="en-US" dirty="0"/>
+                <a:t>Human attempts to write English to Computer</a:t>
               </a:r>
             </a:p>
           </p:txBody>
         </p:sp>
       </p:grpSp>
-      <p:sp>
-        <p:nvSpPr>
-          <p:cNvPr id="3" name="Rectangle 2">
-            <a:extLst>
-              <a:ext uri="{FF2B5EF4-FFF2-40B4-BE49-F238E27FC236}">
-                <a16:creationId xmlns:a16="http://schemas.microsoft.com/office/drawing/2014/main" id="{3AE380A2-0921-4589-9365-B34ABD3CC728}"/>
-              </a:ext>
-            </a:extLst>
-          </p:cNvPr>
-          <p:cNvSpPr/>
-          <p:nvPr/>
-        </p:nvSpPr>
-        <p:spPr>
-          <a:xfrm>
-            <a:off x="8144741" y="1561322"/>
-            <a:ext cx="3771900" cy="3735355"/>
-          </a:xfrm>
-          <a:prstGeom prst="rect">
-            <a:avLst/>
-          </a:prstGeom>
-          <a:noFill/>
-          <a:ln w="57150">
-            <a:solidFill>
-              <a:srgbClr val="FFC000"/>
-            </a:solidFill>
-            <a:prstDash val="lgDash"/>
-          </a:ln>
-        </p:spPr>
-        <p:style>
-          <a:lnRef idx="2">
-            <a:schemeClr val="accent1">
-              <a:shade val="50000"/>
-            </a:schemeClr>
-          </a:lnRef>
-          <a:fillRef idx="1">
-            <a:schemeClr val="accent1"/>
-          </a:fillRef>
-          <a:effectRef idx="0">
-            <a:schemeClr val="accent1"/>
-          </a:effectRef>
-          <a:fontRef idx="minor">
-            <a:schemeClr val="lt1"/>
-          </a:fontRef>
-        </p:style>
-        <p:txBody>
-          <a:bodyPr rtlCol="0" anchor="ctr"/>
-          <a:lstStyle/>
-          <a:p>
-            <a:pPr algn="ctr"/>
-            <a:endParaRPr lang="en-US"/>
-          </a:p>
-        </p:txBody>
-      </p:sp>
-      <p:cxnSp>
-        <p:nvCxnSpPr>
-          <p:cNvPr id="16" name="Straight Arrow Connector 15">
-            <a:extLst>
-              <a:ext uri="{FF2B5EF4-FFF2-40B4-BE49-F238E27FC236}">
-                <a16:creationId xmlns:a16="http://schemas.microsoft.com/office/drawing/2014/main" id="{EC1D0F8A-F46F-481B-B459-39A7BBDDDDC7}"/>
-              </a:ext>
-            </a:extLst>
-          </p:cNvPr>
-          <p:cNvCxnSpPr>
-            <a:cxnSpLocks/>
-          </p:cNvCxnSpPr>
-          <p:nvPr/>
-        </p:nvCxnSpPr>
-        <p:spPr>
-          <a:xfrm>
-            <a:off x="8439708" y="3546764"/>
-            <a:ext cx="1539457" cy="0"/>
-          </a:xfrm>
-          <a:prstGeom prst="straightConnector1">
-            <a:avLst/>
-          </a:prstGeom>
-          <a:ln w="76200">
-            <a:solidFill>
-              <a:schemeClr val="tx1"/>
-            </a:solidFill>
-            <a:prstDash val="dash"/>
-            <a:tailEnd type="triangle"/>
-          </a:ln>
-        </p:spPr>
-        <p:style>
-          <a:lnRef idx="1">
-            <a:schemeClr val="dk1"/>
-          </a:lnRef>
-          <a:fillRef idx="0">
-            <a:schemeClr val="dk1"/>
-          </a:fillRef>
-          <a:effectRef idx="0">
-            <a:schemeClr val="dk1"/>
-          </a:effectRef>
-          <a:fontRef idx="minor">
-            <a:schemeClr val="tx1"/>
-          </a:fontRef>
-        </p:style>
-      </p:cxnSp>
-      <p:sp>
-        <p:nvSpPr>
-          <p:cNvPr id="17" name="TextBox 16">
-            <a:extLst>
-              <a:ext uri="{FF2B5EF4-FFF2-40B4-BE49-F238E27FC236}">
-                <a16:creationId xmlns:a16="http://schemas.microsoft.com/office/drawing/2014/main" id="{36AADEAA-C98E-4D4F-A8EE-BF995B64C35C}"/>
-              </a:ext>
-            </a:extLst>
-          </p:cNvPr>
-          <p:cNvSpPr txBox="1"/>
-          <p:nvPr/>
-        </p:nvSpPr>
-        <p:spPr>
-          <a:xfrm>
-            <a:off x="8546923" y="3112099"/>
-            <a:ext cx="1056482" cy="338554"/>
-          </a:xfrm>
-          <a:prstGeom prst="rect">
-            <a:avLst/>
-          </a:prstGeom>
-          <a:noFill/>
-        </p:spPr>
-        <p:txBody>
-          <a:bodyPr wrap="square" rtlCol="0">
-            <a:spAutoFit/>
-          </a:bodyPr>
-          <a:lstStyle/>
-          <a:p>
-            <a:r>
-              <a:rPr lang="en-US" sz="1600" b="1" dirty="0"/>
-              <a:t>0010 0010</a:t>
-            </a:r>
-          </a:p>
-        </p:txBody>
-      </p:sp>
-      <p:sp>
-        <p:nvSpPr>
-          <p:cNvPr id="18" name="TextBox 17">
-            <a:extLst>
-              <a:ext uri="{FF2B5EF4-FFF2-40B4-BE49-F238E27FC236}">
-                <a16:creationId xmlns:a16="http://schemas.microsoft.com/office/drawing/2014/main" id="{FA10870E-3AC9-4ADB-B9AC-2506195E2A22}"/>
-              </a:ext>
-            </a:extLst>
-          </p:cNvPr>
-          <p:cNvSpPr txBox="1"/>
-          <p:nvPr/>
-        </p:nvSpPr>
-        <p:spPr>
-          <a:xfrm>
-            <a:off x="9502450" y="1124364"/>
-            <a:ext cx="1056482" cy="338554"/>
-          </a:xfrm>
-          <a:prstGeom prst="rect">
-            <a:avLst/>
-          </a:prstGeom>
-          <a:noFill/>
-        </p:spPr>
-        <p:txBody>
-          <a:bodyPr wrap="square" rtlCol="0">
-            <a:spAutoFit/>
-          </a:bodyPr>
-          <a:lstStyle/>
-          <a:p>
-            <a:r>
-              <a:rPr lang="en-US" sz="1600" b="1" dirty="0"/>
-              <a:t>Translator</a:t>
-            </a:r>
-          </a:p>
-        </p:txBody>
-      </p:sp>
     </p:spTree>
     <p:extLst>
       <p:ext uri="{BB962C8B-B14F-4D97-AF65-F5344CB8AC3E}">
-        <p14:creationId xmlns:p14="http://schemas.microsoft.com/office/powerpoint/2010/main" val="294323650"/>
+        <p14:creationId xmlns:p14="http://schemas.microsoft.com/office/powerpoint/2010/main" val="1027035372"/>
       </p:ext>
     </p:extLst>
   </p:cSld>
@@ -4692,6 +4501,1019 @@
         </p:nvSpPr>
         <p:spPr>
           <a:xfrm>
+            <a:off x="5302698" y="681037"/>
+            <a:ext cx="1249060" cy="430887"/>
+          </a:xfrm>
+          <a:prstGeom prst="rect">
+            <a:avLst/>
+          </a:prstGeom>
+          <a:noFill/>
+        </p:spPr>
+        <p:txBody>
+          <a:bodyPr wrap="none" rtlCol="0">
+            <a:spAutoFit/>
+          </a:bodyPr>
+          <a:lstStyle/>
+          <a:p>
+            <a:r>
+              <a:rPr lang="en-US" sz="2200" b="1" dirty="0">
+                <a:solidFill>
+                  <a:srgbClr val="FF9000"/>
+                </a:solidFill>
+                <a:latin typeface="Montserrat" panose="00000500000000000000" pitchFamily="2" charset="0"/>
+              </a:rPr>
+              <a:t>Coding</a:t>
+            </a:r>
+          </a:p>
+        </p:txBody>
+      </p:sp>
+      <p:pic>
+        <p:nvPicPr>
+          <p:cNvPr id="5" name="Picture 4">
+            <a:extLst>
+              <a:ext uri="{FF2B5EF4-FFF2-40B4-BE49-F238E27FC236}">
+                <a16:creationId xmlns:a16="http://schemas.microsoft.com/office/drawing/2014/main" id="{734E72FC-E1A7-4C5C-B5FA-16669EE5C948}"/>
+              </a:ext>
+            </a:extLst>
+          </p:cNvPr>
+          <p:cNvPicPr>
+            <a:picLocks noChangeAspect="1"/>
+          </p:cNvPicPr>
+          <p:nvPr/>
+        </p:nvPicPr>
+        <p:blipFill>
+          <a:blip r:embed="rId2">
+            <a:extLst>
+              <a:ext uri="{28A0092B-C50C-407E-A947-70E740481C1C}">
+                <a14:useLocalDpi xmlns:a14="http://schemas.microsoft.com/office/drawing/2010/main" val="0"/>
+              </a:ext>
+            </a:extLst>
+          </a:blip>
+          <a:stretch>
+            <a:fillRect/>
+          </a:stretch>
+        </p:blipFill>
+        <p:spPr>
+          <a:xfrm>
+            <a:off x="8707582" y="2495853"/>
+            <a:ext cx="2509575" cy="2509575"/>
+          </a:xfrm>
+          <a:prstGeom prst="rect">
+            <a:avLst/>
+          </a:prstGeom>
+        </p:spPr>
+      </p:pic>
+      <p:pic>
+        <p:nvPicPr>
+          <p:cNvPr id="7" name="Picture 6">
+            <a:extLst>
+              <a:ext uri="{FF2B5EF4-FFF2-40B4-BE49-F238E27FC236}">
+                <a16:creationId xmlns:a16="http://schemas.microsoft.com/office/drawing/2014/main" id="{0FC344B0-E20B-4240-A114-FA26C3420C11}"/>
+              </a:ext>
+            </a:extLst>
+          </p:cNvPr>
+          <p:cNvPicPr>
+            <a:picLocks noChangeAspect="1"/>
+          </p:cNvPicPr>
+          <p:nvPr/>
+        </p:nvPicPr>
+        <p:blipFill>
+          <a:blip r:embed="rId3">
+            <a:extLst>
+              <a:ext uri="{28A0092B-C50C-407E-A947-70E740481C1C}">
+                <a14:useLocalDpi xmlns:a14="http://schemas.microsoft.com/office/drawing/2010/main" val="0"/>
+              </a:ext>
+            </a:extLst>
+          </a:blip>
+          <a:stretch>
+            <a:fillRect/>
+          </a:stretch>
+        </p:blipFill>
+        <p:spPr>
+          <a:xfrm>
+            <a:off x="1562793" y="2495853"/>
+            <a:ext cx="1104702" cy="2666522"/>
+          </a:xfrm>
+          <a:prstGeom prst="rect">
+            <a:avLst/>
+          </a:prstGeom>
+        </p:spPr>
+      </p:pic>
+      <p:cxnSp>
+        <p:nvCxnSpPr>
+          <p:cNvPr id="8" name="Straight Arrow Connector 7">
+            <a:extLst>
+              <a:ext uri="{FF2B5EF4-FFF2-40B4-BE49-F238E27FC236}">
+                <a16:creationId xmlns:a16="http://schemas.microsoft.com/office/drawing/2014/main" id="{93CDEECC-1BA2-4107-A867-6A6A3FF92D31}"/>
+              </a:ext>
+            </a:extLst>
+          </p:cNvPr>
+          <p:cNvCxnSpPr>
+            <a:cxnSpLocks/>
+          </p:cNvCxnSpPr>
+          <p:nvPr/>
+        </p:nvCxnSpPr>
+        <p:spPr>
+          <a:xfrm>
+            <a:off x="3484419" y="3546764"/>
+            <a:ext cx="4509654" cy="0"/>
+          </a:xfrm>
+          <a:prstGeom prst="straightConnector1">
+            <a:avLst/>
+          </a:prstGeom>
+          <a:ln w="76200">
+            <a:solidFill>
+              <a:schemeClr val="tx1"/>
+            </a:solidFill>
+            <a:prstDash val="dash"/>
+            <a:tailEnd type="triangle"/>
+          </a:ln>
+        </p:spPr>
+        <p:style>
+          <a:lnRef idx="1">
+            <a:schemeClr val="dk1"/>
+          </a:lnRef>
+          <a:fillRef idx="0">
+            <a:schemeClr val="dk1"/>
+          </a:fillRef>
+          <a:effectRef idx="0">
+            <a:schemeClr val="dk1"/>
+          </a:effectRef>
+          <a:fontRef idx="minor">
+            <a:schemeClr val="tx1"/>
+          </a:fontRef>
+        </p:style>
+      </p:cxnSp>
+      <p:sp>
+        <p:nvSpPr>
+          <p:cNvPr id="12" name="TextBox 11">
+            <a:extLst>
+              <a:ext uri="{FF2B5EF4-FFF2-40B4-BE49-F238E27FC236}">
+                <a16:creationId xmlns:a16="http://schemas.microsoft.com/office/drawing/2014/main" id="{94420BDD-3CDA-475B-96C7-13A37E2B22CB}"/>
+              </a:ext>
+            </a:extLst>
+          </p:cNvPr>
+          <p:cNvSpPr txBox="1"/>
+          <p:nvPr/>
+        </p:nvSpPr>
+        <p:spPr>
+          <a:xfrm>
+            <a:off x="5043055" y="3059668"/>
+            <a:ext cx="1856509" cy="369332"/>
+          </a:xfrm>
+          <a:prstGeom prst="rect">
+            <a:avLst/>
+          </a:prstGeom>
+          <a:noFill/>
+        </p:spPr>
+        <p:txBody>
+          <a:bodyPr wrap="square" rtlCol="0">
+            <a:spAutoFit/>
+          </a:bodyPr>
+          <a:lstStyle/>
+          <a:p>
+            <a:r>
+              <a:rPr lang="en-US" b="1" dirty="0"/>
+              <a:t>Instruction/Code</a:t>
+            </a:r>
+          </a:p>
+        </p:txBody>
+      </p:sp>
+      <p:grpSp>
+        <p:nvGrpSpPr>
+          <p:cNvPr id="13" name="Group 12">
+            <a:extLst>
+              <a:ext uri="{FF2B5EF4-FFF2-40B4-BE49-F238E27FC236}">
+                <a16:creationId xmlns:a16="http://schemas.microsoft.com/office/drawing/2014/main" id="{CD4B1333-4D4A-4050-8534-F7DB2E1D15F1}"/>
+              </a:ext>
+            </a:extLst>
+          </p:cNvPr>
+          <p:cNvGrpSpPr/>
+          <p:nvPr/>
+        </p:nvGrpSpPr>
+        <p:grpSpPr>
+          <a:xfrm>
+            <a:off x="3311236" y="5608944"/>
+            <a:ext cx="5709851" cy="568020"/>
+            <a:chOff x="3646951" y="5562851"/>
+            <a:chExt cx="5007959" cy="568020"/>
+          </a:xfrm>
+        </p:grpSpPr>
+        <p:sp>
+          <p:nvSpPr>
+            <p:cNvPr id="14" name="Double Brace 13">
+              <a:extLst>
+                <a:ext uri="{FF2B5EF4-FFF2-40B4-BE49-F238E27FC236}">
+                  <a16:creationId xmlns:a16="http://schemas.microsoft.com/office/drawing/2014/main" id="{620F8BF4-9744-4DDB-8979-D96C5359B56E}"/>
+                </a:ext>
+              </a:extLst>
+            </p:cNvPr>
+            <p:cNvSpPr/>
+            <p:nvPr/>
+          </p:nvSpPr>
+          <p:spPr>
+            <a:xfrm>
+              <a:off x="3646951" y="5562851"/>
+              <a:ext cx="4862945" cy="568020"/>
+            </a:xfrm>
+            <a:prstGeom prst="bracePair">
+              <a:avLst/>
+            </a:prstGeom>
+            <a:ln w="38100">
+              <a:solidFill>
+                <a:srgbClr val="FF9000"/>
+              </a:solidFill>
+            </a:ln>
+          </p:spPr>
+          <p:style>
+            <a:lnRef idx="1">
+              <a:schemeClr val="accent1"/>
+            </a:lnRef>
+            <a:fillRef idx="0">
+              <a:schemeClr val="accent1"/>
+            </a:fillRef>
+            <a:effectRef idx="0">
+              <a:schemeClr val="accent1"/>
+            </a:effectRef>
+            <a:fontRef idx="minor">
+              <a:schemeClr val="tx1"/>
+            </a:fontRef>
+          </p:style>
+          <p:txBody>
+            <a:bodyPr rtlCol="0" anchor="ctr"/>
+            <a:lstStyle/>
+            <a:p>
+              <a:pPr algn="ctr"/>
+              <a:endParaRPr lang="en-US"/>
+            </a:p>
+          </p:txBody>
+        </p:sp>
+        <p:sp>
+          <p:nvSpPr>
+            <p:cNvPr id="15" name="TextBox 14">
+              <a:extLst>
+                <a:ext uri="{FF2B5EF4-FFF2-40B4-BE49-F238E27FC236}">
+                  <a16:creationId xmlns:a16="http://schemas.microsoft.com/office/drawing/2014/main" id="{70D4B29C-8242-44E1-9967-7D3BAF5FF219}"/>
+                </a:ext>
+              </a:extLst>
+            </p:cNvPr>
+            <p:cNvSpPr txBox="1"/>
+            <p:nvPr/>
+          </p:nvSpPr>
+          <p:spPr>
+            <a:xfrm>
+              <a:off x="3910663" y="5662195"/>
+              <a:ext cx="4744247" cy="369332"/>
+            </a:xfrm>
+            <a:prstGeom prst="rect">
+              <a:avLst/>
+            </a:prstGeom>
+            <a:noFill/>
+          </p:spPr>
+          <p:txBody>
+            <a:bodyPr wrap="none" rtlCol="0">
+              <a:spAutoFit/>
+            </a:bodyPr>
+            <a:lstStyle/>
+            <a:p>
+              <a:r>
+                <a:rPr lang="en-US" dirty="0"/>
+                <a:t>Computer does not understand English language</a:t>
+              </a:r>
+            </a:p>
+          </p:txBody>
+        </p:sp>
+      </p:grpSp>
+    </p:spTree>
+    <p:extLst>
+      <p:ext uri="{BB962C8B-B14F-4D97-AF65-F5344CB8AC3E}">
+        <p14:creationId xmlns:p14="http://schemas.microsoft.com/office/powerpoint/2010/main" val="2113416708"/>
+      </p:ext>
+    </p:extLst>
+  </p:cSld>
+  <p:clrMapOvr>
+    <a:masterClrMapping/>
+  </p:clrMapOvr>
+  <p:timing>
+    <p:tnLst>
+      <p:par>
+        <p:cTn id="1" dur="indefinite" restart="never" nodeType="tmRoot">
+          <p:childTnLst>
+            <p:seq concurrent="1" nextAc="seek">
+              <p:cTn id="2" dur="indefinite" nodeType="mainSeq">
+                <p:childTnLst>
+                  <p:par>
+                    <p:cTn id="3" fill="hold">
+                      <p:stCondLst>
+                        <p:cond delay="indefinite"/>
+                      </p:stCondLst>
+                      <p:childTnLst>
+                        <p:par>
+                          <p:cTn id="4" fill="hold">
+                            <p:stCondLst>
+                              <p:cond delay="0"/>
+                            </p:stCondLst>
+                            <p:childTnLst>
+                              <p:par>
+                                <p:cTn id="5" presetID="10" presetClass="entr" presetSubtype="0" fill="hold" nodeType="clickEffect">
+                                  <p:stCondLst>
+                                    <p:cond delay="0"/>
+                                  </p:stCondLst>
+                                  <p:childTnLst>
+                                    <p:set>
+                                      <p:cBhvr>
+                                        <p:cTn id="6" dur="1" fill="hold">
+                                          <p:stCondLst>
+                                            <p:cond delay="0"/>
+                                          </p:stCondLst>
+                                        </p:cTn>
+                                        <p:tgtEl>
+                                          <p:spTgt spid="13"/>
+                                        </p:tgtEl>
+                                        <p:attrNameLst>
+                                          <p:attrName>style.visibility</p:attrName>
+                                        </p:attrNameLst>
+                                      </p:cBhvr>
+                                      <p:to>
+                                        <p:strVal val="visible"/>
+                                      </p:to>
+                                    </p:set>
+                                    <p:animEffect transition="in" filter="fade">
+                                      <p:cBhvr>
+                                        <p:cTn id="7" dur="500"/>
+                                        <p:tgtEl>
+                                          <p:spTgt spid="13"/>
+                                        </p:tgtEl>
+                                      </p:cBhvr>
+                                    </p:animEffect>
+                                  </p:childTnLst>
+                                </p:cTn>
+                              </p:par>
+                            </p:childTnLst>
+                          </p:cTn>
+                        </p:par>
+                      </p:childTnLst>
+                    </p:cTn>
+                  </p:par>
+                </p:childTnLst>
+              </p:cTn>
+              <p:prevCondLst>
+                <p:cond evt="onPrev" delay="0">
+                  <p:tgtEl>
+                    <p:sldTgt/>
+                  </p:tgtEl>
+                </p:cond>
+              </p:prevCondLst>
+              <p:nextCondLst>
+                <p:cond evt="onNext" delay="0">
+                  <p:tgtEl>
+                    <p:sldTgt/>
+                  </p:tgtEl>
+                </p:cond>
+              </p:nextCondLst>
+            </p:seq>
+          </p:childTnLst>
+        </p:cTn>
+      </p:par>
+    </p:tnLst>
+  </p:timing>
+</p:sld>
+</file>
+
+<file path=ppt/slides/slide12.xml><?xml version="1.0" encoding="utf-8"?>
+<p:sld xmlns:a="http://schemas.openxmlformats.org/drawingml/2006/main" xmlns:r="http://schemas.openxmlformats.org/officeDocument/2006/relationships" xmlns:p="http://schemas.openxmlformats.org/presentationml/2006/main">
+  <p:cSld>
+    <p:spTree>
+      <p:nvGrpSpPr>
+        <p:cNvPr id="1" name=""/>
+        <p:cNvGrpSpPr/>
+        <p:nvPr/>
+      </p:nvGrpSpPr>
+      <p:grpSpPr>
+        <a:xfrm>
+          <a:off x="0" y="0"/>
+          <a:ext cx="0" cy="0"/>
+          <a:chOff x="0" y="0"/>
+          <a:chExt cx="0" cy="0"/>
+        </a:xfrm>
+      </p:grpSpPr>
+      <p:sp>
+        <p:nvSpPr>
+          <p:cNvPr id="4" name="TextBox 3">
+            <a:extLst>
+              <a:ext uri="{FF2B5EF4-FFF2-40B4-BE49-F238E27FC236}">
+                <a16:creationId xmlns:a16="http://schemas.microsoft.com/office/drawing/2014/main" id="{2676B0D9-ED59-4164-BC32-8840B2788507}"/>
+              </a:ext>
+            </a:extLst>
+          </p:cNvPr>
+          <p:cNvSpPr txBox="1"/>
+          <p:nvPr/>
+        </p:nvSpPr>
+        <p:spPr>
+          <a:xfrm>
+            <a:off x="5302698" y="681037"/>
+            <a:ext cx="1249060" cy="430887"/>
+          </a:xfrm>
+          <a:prstGeom prst="rect">
+            <a:avLst/>
+          </a:prstGeom>
+          <a:noFill/>
+        </p:spPr>
+        <p:txBody>
+          <a:bodyPr wrap="none" rtlCol="0">
+            <a:spAutoFit/>
+          </a:bodyPr>
+          <a:lstStyle/>
+          <a:p>
+            <a:r>
+              <a:rPr lang="en-US" sz="2200" b="1" dirty="0">
+                <a:solidFill>
+                  <a:srgbClr val="FF9000"/>
+                </a:solidFill>
+                <a:latin typeface="Montserrat" panose="00000500000000000000" pitchFamily="2" charset="0"/>
+              </a:rPr>
+              <a:t>Coding</a:t>
+            </a:r>
+          </a:p>
+        </p:txBody>
+      </p:sp>
+      <p:pic>
+        <p:nvPicPr>
+          <p:cNvPr id="5" name="Picture 4">
+            <a:extLst>
+              <a:ext uri="{FF2B5EF4-FFF2-40B4-BE49-F238E27FC236}">
+                <a16:creationId xmlns:a16="http://schemas.microsoft.com/office/drawing/2014/main" id="{734E72FC-E1A7-4C5C-B5FA-16669EE5C948}"/>
+              </a:ext>
+            </a:extLst>
+          </p:cNvPr>
+          <p:cNvPicPr>
+            <a:picLocks noChangeAspect="1"/>
+          </p:cNvPicPr>
+          <p:nvPr/>
+        </p:nvPicPr>
+        <p:blipFill>
+          <a:blip r:embed="rId2">
+            <a:extLst>
+              <a:ext uri="{28A0092B-C50C-407E-A947-70E740481C1C}">
+                <a14:useLocalDpi xmlns:a14="http://schemas.microsoft.com/office/drawing/2010/main" val="0"/>
+              </a:ext>
+            </a:extLst>
+          </a:blip>
+          <a:stretch>
+            <a:fillRect/>
+          </a:stretch>
+        </p:blipFill>
+        <p:spPr>
+          <a:xfrm>
+            <a:off x="10030691" y="2937164"/>
+            <a:ext cx="1458664" cy="1458664"/>
+          </a:xfrm>
+          <a:prstGeom prst="rect">
+            <a:avLst/>
+          </a:prstGeom>
+        </p:spPr>
+      </p:pic>
+      <p:pic>
+        <p:nvPicPr>
+          <p:cNvPr id="7" name="Picture 6">
+            <a:extLst>
+              <a:ext uri="{FF2B5EF4-FFF2-40B4-BE49-F238E27FC236}">
+                <a16:creationId xmlns:a16="http://schemas.microsoft.com/office/drawing/2014/main" id="{0FC344B0-E20B-4240-A114-FA26C3420C11}"/>
+              </a:ext>
+            </a:extLst>
+          </p:cNvPr>
+          <p:cNvPicPr>
+            <a:picLocks noChangeAspect="1"/>
+          </p:cNvPicPr>
+          <p:nvPr/>
+        </p:nvPicPr>
+        <p:blipFill>
+          <a:blip r:embed="rId3">
+            <a:extLst>
+              <a:ext uri="{28A0092B-C50C-407E-A947-70E740481C1C}">
+                <a14:useLocalDpi xmlns:a14="http://schemas.microsoft.com/office/drawing/2010/main" val="0"/>
+              </a:ext>
+            </a:extLst>
+          </a:blip>
+          <a:stretch>
+            <a:fillRect/>
+          </a:stretch>
+        </p:blipFill>
+        <p:spPr>
+          <a:xfrm>
+            <a:off x="1562793" y="2495853"/>
+            <a:ext cx="1104702" cy="2666522"/>
+          </a:xfrm>
+          <a:prstGeom prst="rect">
+            <a:avLst/>
+          </a:prstGeom>
+        </p:spPr>
+      </p:pic>
+      <p:grpSp>
+        <p:nvGrpSpPr>
+          <p:cNvPr id="2" name="Group 1">
+            <a:extLst>
+              <a:ext uri="{FF2B5EF4-FFF2-40B4-BE49-F238E27FC236}">
+                <a16:creationId xmlns:a16="http://schemas.microsoft.com/office/drawing/2014/main" id="{87D83FFC-BBDF-4E11-89BF-EC537600ADD1}"/>
+              </a:ext>
+            </a:extLst>
+          </p:cNvPr>
+          <p:cNvGrpSpPr/>
+          <p:nvPr/>
+        </p:nvGrpSpPr>
+        <p:grpSpPr>
+          <a:xfrm>
+            <a:off x="3484419" y="3059668"/>
+            <a:ext cx="4509654" cy="487096"/>
+            <a:chOff x="3484419" y="3059668"/>
+            <a:chExt cx="4509654" cy="487096"/>
+          </a:xfrm>
+        </p:grpSpPr>
+        <p:cxnSp>
+          <p:nvCxnSpPr>
+            <p:cNvPr id="8" name="Straight Arrow Connector 7">
+              <a:extLst>
+                <a:ext uri="{FF2B5EF4-FFF2-40B4-BE49-F238E27FC236}">
+                  <a16:creationId xmlns:a16="http://schemas.microsoft.com/office/drawing/2014/main" id="{93CDEECC-1BA2-4107-A867-6A6A3FF92D31}"/>
+                </a:ext>
+              </a:extLst>
+            </p:cNvPr>
+            <p:cNvCxnSpPr>
+              <a:cxnSpLocks/>
+            </p:cNvCxnSpPr>
+            <p:nvPr/>
+          </p:nvCxnSpPr>
+          <p:spPr>
+            <a:xfrm>
+              <a:off x="3484419" y="3546764"/>
+              <a:ext cx="4509654" cy="0"/>
+            </a:xfrm>
+            <a:prstGeom prst="straightConnector1">
+              <a:avLst/>
+            </a:prstGeom>
+            <a:ln w="76200">
+              <a:solidFill>
+                <a:schemeClr val="tx1"/>
+              </a:solidFill>
+              <a:prstDash val="dash"/>
+              <a:tailEnd type="triangle"/>
+            </a:ln>
+          </p:spPr>
+          <p:style>
+            <a:lnRef idx="1">
+              <a:schemeClr val="dk1"/>
+            </a:lnRef>
+            <a:fillRef idx="0">
+              <a:schemeClr val="dk1"/>
+            </a:fillRef>
+            <a:effectRef idx="0">
+              <a:schemeClr val="dk1"/>
+            </a:effectRef>
+            <a:fontRef idx="minor">
+              <a:schemeClr val="tx1"/>
+            </a:fontRef>
+          </p:style>
+        </p:cxnSp>
+        <p:sp>
+          <p:nvSpPr>
+            <p:cNvPr id="12" name="TextBox 11">
+              <a:extLst>
+                <a:ext uri="{FF2B5EF4-FFF2-40B4-BE49-F238E27FC236}">
+                  <a16:creationId xmlns:a16="http://schemas.microsoft.com/office/drawing/2014/main" id="{94420BDD-3CDA-475B-96C7-13A37E2B22CB}"/>
+                </a:ext>
+              </a:extLst>
+            </p:cNvPr>
+            <p:cNvSpPr txBox="1"/>
+            <p:nvPr/>
+          </p:nvSpPr>
+          <p:spPr>
+            <a:xfrm>
+              <a:off x="5043055" y="3059668"/>
+              <a:ext cx="1856509" cy="369332"/>
+            </a:xfrm>
+            <a:prstGeom prst="rect">
+              <a:avLst/>
+            </a:prstGeom>
+            <a:noFill/>
+          </p:spPr>
+          <p:txBody>
+            <a:bodyPr wrap="square" rtlCol="0">
+              <a:spAutoFit/>
+            </a:bodyPr>
+            <a:lstStyle/>
+            <a:p>
+              <a:r>
+                <a:rPr lang="en-US" b="1" dirty="0"/>
+                <a:t>Instruction/Code</a:t>
+              </a:r>
+            </a:p>
+          </p:txBody>
+        </p:sp>
+      </p:grpSp>
+      <p:grpSp>
+        <p:nvGrpSpPr>
+          <p:cNvPr id="13" name="Group 12">
+            <a:extLst>
+              <a:ext uri="{FF2B5EF4-FFF2-40B4-BE49-F238E27FC236}">
+                <a16:creationId xmlns:a16="http://schemas.microsoft.com/office/drawing/2014/main" id="{CD4B1333-4D4A-4050-8534-F7DB2E1D15F1}"/>
+              </a:ext>
+            </a:extLst>
+          </p:cNvPr>
+          <p:cNvGrpSpPr/>
+          <p:nvPr/>
+        </p:nvGrpSpPr>
+        <p:grpSpPr>
+          <a:xfrm>
+            <a:off x="1918407" y="5771670"/>
+            <a:ext cx="8640525" cy="745675"/>
+            <a:chOff x="3646951" y="5562851"/>
+            <a:chExt cx="4862945" cy="745675"/>
+          </a:xfrm>
+        </p:grpSpPr>
+        <p:sp>
+          <p:nvSpPr>
+            <p:cNvPr id="14" name="Double Brace 13">
+              <a:extLst>
+                <a:ext uri="{FF2B5EF4-FFF2-40B4-BE49-F238E27FC236}">
+                  <a16:creationId xmlns:a16="http://schemas.microsoft.com/office/drawing/2014/main" id="{620F8BF4-9744-4DDB-8979-D96C5359B56E}"/>
+                </a:ext>
+              </a:extLst>
+            </p:cNvPr>
+            <p:cNvSpPr/>
+            <p:nvPr/>
+          </p:nvSpPr>
+          <p:spPr>
+            <a:xfrm>
+              <a:off x="3646951" y="5562851"/>
+              <a:ext cx="4862945" cy="568020"/>
+            </a:xfrm>
+            <a:prstGeom prst="bracePair">
+              <a:avLst/>
+            </a:prstGeom>
+            <a:ln w="38100">
+              <a:solidFill>
+                <a:srgbClr val="FF9000"/>
+              </a:solidFill>
+            </a:ln>
+          </p:spPr>
+          <p:style>
+            <a:lnRef idx="1">
+              <a:schemeClr val="accent1"/>
+            </a:lnRef>
+            <a:fillRef idx="0">
+              <a:schemeClr val="accent1"/>
+            </a:fillRef>
+            <a:effectRef idx="0">
+              <a:schemeClr val="accent1"/>
+            </a:effectRef>
+            <a:fontRef idx="minor">
+              <a:schemeClr val="tx1"/>
+            </a:fontRef>
+          </p:style>
+          <p:txBody>
+            <a:bodyPr rtlCol="0" anchor="ctr"/>
+            <a:lstStyle/>
+            <a:p>
+              <a:pPr algn="ctr"/>
+              <a:endParaRPr lang="en-US"/>
+            </a:p>
+          </p:txBody>
+        </p:sp>
+        <p:sp>
+          <p:nvSpPr>
+            <p:cNvPr id="15" name="TextBox 14">
+              <a:extLst>
+                <a:ext uri="{FF2B5EF4-FFF2-40B4-BE49-F238E27FC236}">
+                  <a16:creationId xmlns:a16="http://schemas.microsoft.com/office/drawing/2014/main" id="{70D4B29C-8242-44E1-9967-7D3BAF5FF219}"/>
+                </a:ext>
+              </a:extLst>
+            </p:cNvPr>
+            <p:cNvSpPr txBox="1"/>
+            <p:nvPr/>
+          </p:nvSpPr>
+          <p:spPr>
+            <a:xfrm>
+              <a:off x="3847564" y="5662195"/>
+              <a:ext cx="4503783" cy="646331"/>
+            </a:xfrm>
+            <a:prstGeom prst="rect">
+              <a:avLst/>
+            </a:prstGeom>
+            <a:noFill/>
+          </p:spPr>
+          <p:txBody>
+            <a:bodyPr wrap="square" rtlCol="0">
+              <a:spAutoFit/>
+            </a:bodyPr>
+            <a:lstStyle/>
+            <a:p>
+              <a:r>
+                <a:rPr lang="en-US" dirty="0">
+                  <a:latin typeface="open sans" panose="020B0606030504020204" pitchFamily="34" charset="0"/>
+                  <a:ea typeface="open sans" panose="020B0606030504020204" pitchFamily="34" charset="0"/>
+                  <a:cs typeface="open sans" panose="020B0606030504020204" pitchFamily="34" charset="0"/>
+                </a:rPr>
+                <a:t>A translator comes in to explain what user is saying in machine language</a:t>
+              </a:r>
+            </a:p>
+          </p:txBody>
+        </p:sp>
+      </p:grpSp>
+      <p:sp>
+        <p:nvSpPr>
+          <p:cNvPr id="3" name="Rectangle 2">
+            <a:extLst>
+              <a:ext uri="{FF2B5EF4-FFF2-40B4-BE49-F238E27FC236}">
+                <a16:creationId xmlns:a16="http://schemas.microsoft.com/office/drawing/2014/main" id="{3AE380A2-0921-4589-9365-B34ABD3CC728}"/>
+              </a:ext>
+            </a:extLst>
+          </p:cNvPr>
+          <p:cNvSpPr/>
+          <p:nvPr/>
+        </p:nvSpPr>
+        <p:spPr>
+          <a:xfrm>
+            <a:off x="8144741" y="1561322"/>
+            <a:ext cx="3771900" cy="3735355"/>
+          </a:xfrm>
+          <a:prstGeom prst="rect">
+            <a:avLst/>
+          </a:prstGeom>
+          <a:noFill/>
+          <a:ln w="57150">
+            <a:solidFill>
+              <a:srgbClr val="FFC000"/>
+            </a:solidFill>
+            <a:prstDash val="lgDash"/>
+          </a:ln>
+        </p:spPr>
+        <p:style>
+          <a:lnRef idx="2">
+            <a:schemeClr val="accent1">
+              <a:shade val="50000"/>
+            </a:schemeClr>
+          </a:lnRef>
+          <a:fillRef idx="1">
+            <a:schemeClr val="accent1"/>
+          </a:fillRef>
+          <a:effectRef idx="0">
+            <a:schemeClr val="accent1"/>
+          </a:effectRef>
+          <a:fontRef idx="minor">
+            <a:schemeClr val="lt1"/>
+          </a:fontRef>
+        </p:style>
+        <p:txBody>
+          <a:bodyPr rtlCol="0" anchor="ctr"/>
+          <a:lstStyle/>
+          <a:p>
+            <a:pPr algn="ctr"/>
+            <a:endParaRPr lang="en-US"/>
+          </a:p>
+        </p:txBody>
+      </p:sp>
+      <p:cxnSp>
+        <p:nvCxnSpPr>
+          <p:cNvPr id="16" name="Straight Arrow Connector 15">
+            <a:extLst>
+              <a:ext uri="{FF2B5EF4-FFF2-40B4-BE49-F238E27FC236}">
+                <a16:creationId xmlns:a16="http://schemas.microsoft.com/office/drawing/2014/main" id="{EC1D0F8A-F46F-481B-B459-39A7BBDDDDC7}"/>
+              </a:ext>
+            </a:extLst>
+          </p:cNvPr>
+          <p:cNvCxnSpPr>
+            <a:cxnSpLocks/>
+          </p:cNvCxnSpPr>
+          <p:nvPr/>
+        </p:nvCxnSpPr>
+        <p:spPr>
+          <a:xfrm>
+            <a:off x="8439708" y="3546764"/>
+            <a:ext cx="1539457" cy="0"/>
+          </a:xfrm>
+          <a:prstGeom prst="straightConnector1">
+            <a:avLst/>
+          </a:prstGeom>
+          <a:ln w="76200">
+            <a:solidFill>
+              <a:schemeClr val="tx1"/>
+            </a:solidFill>
+            <a:prstDash val="dash"/>
+            <a:tailEnd type="triangle"/>
+          </a:ln>
+        </p:spPr>
+        <p:style>
+          <a:lnRef idx="1">
+            <a:schemeClr val="dk1"/>
+          </a:lnRef>
+          <a:fillRef idx="0">
+            <a:schemeClr val="dk1"/>
+          </a:fillRef>
+          <a:effectRef idx="0">
+            <a:schemeClr val="dk1"/>
+          </a:effectRef>
+          <a:fontRef idx="minor">
+            <a:schemeClr val="tx1"/>
+          </a:fontRef>
+        </p:style>
+      </p:cxnSp>
+      <p:sp>
+        <p:nvSpPr>
+          <p:cNvPr id="17" name="TextBox 16">
+            <a:extLst>
+              <a:ext uri="{FF2B5EF4-FFF2-40B4-BE49-F238E27FC236}">
+                <a16:creationId xmlns:a16="http://schemas.microsoft.com/office/drawing/2014/main" id="{36AADEAA-C98E-4D4F-A8EE-BF995B64C35C}"/>
+              </a:ext>
+            </a:extLst>
+          </p:cNvPr>
+          <p:cNvSpPr txBox="1"/>
+          <p:nvPr/>
+        </p:nvSpPr>
+        <p:spPr>
+          <a:xfrm>
+            <a:off x="8546923" y="3112099"/>
+            <a:ext cx="1056482" cy="338554"/>
+          </a:xfrm>
+          <a:prstGeom prst="rect">
+            <a:avLst/>
+          </a:prstGeom>
+          <a:noFill/>
+        </p:spPr>
+        <p:txBody>
+          <a:bodyPr wrap="square" rtlCol="0">
+            <a:spAutoFit/>
+          </a:bodyPr>
+          <a:lstStyle/>
+          <a:p>
+            <a:r>
+              <a:rPr lang="en-US" sz="1600" b="1" dirty="0"/>
+              <a:t>0010 0010</a:t>
+            </a:r>
+          </a:p>
+        </p:txBody>
+      </p:sp>
+      <p:sp>
+        <p:nvSpPr>
+          <p:cNvPr id="18" name="TextBox 17">
+            <a:extLst>
+              <a:ext uri="{FF2B5EF4-FFF2-40B4-BE49-F238E27FC236}">
+                <a16:creationId xmlns:a16="http://schemas.microsoft.com/office/drawing/2014/main" id="{FA10870E-3AC9-4ADB-B9AC-2506195E2A22}"/>
+              </a:ext>
+            </a:extLst>
+          </p:cNvPr>
+          <p:cNvSpPr txBox="1"/>
+          <p:nvPr/>
+        </p:nvSpPr>
+        <p:spPr>
+          <a:xfrm>
+            <a:off x="9502450" y="1124364"/>
+            <a:ext cx="1056482" cy="338554"/>
+          </a:xfrm>
+          <a:prstGeom prst="rect">
+            <a:avLst/>
+          </a:prstGeom>
+          <a:noFill/>
+        </p:spPr>
+        <p:txBody>
+          <a:bodyPr wrap="square" rtlCol="0">
+            <a:spAutoFit/>
+          </a:bodyPr>
+          <a:lstStyle/>
+          <a:p>
+            <a:r>
+              <a:rPr lang="en-US" sz="1600" b="1" dirty="0"/>
+              <a:t>Translator</a:t>
+            </a:r>
+          </a:p>
+        </p:txBody>
+      </p:sp>
+    </p:spTree>
+    <p:extLst>
+      <p:ext uri="{BB962C8B-B14F-4D97-AF65-F5344CB8AC3E}">
+        <p14:creationId xmlns:p14="http://schemas.microsoft.com/office/powerpoint/2010/main" val="294323650"/>
+      </p:ext>
+    </p:extLst>
+  </p:cSld>
+  <p:clrMapOvr>
+    <a:masterClrMapping/>
+  </p:clrMapOvr>
+  <p:timing>
+    <p:tnLst>
+      <p:par>
+        <p:cTn id="1" dur="indefinite" restart="never" nodeType="tmRoot">
+          <p:childTnLst>
+            <p:seq concurrent="1" nextAc="seek">
+              <p:cTn id="2" dur="indefinite" nodeType="mainSeq">
+                <p:childTnLst>
+                  <p:par>
+                    <p:cTn id="3" fill="hold">
+                      <p:stCondLst>
+                        <p:cond delay="indefinite"/>
+                      </p:stCondLst>
+                      <p:childTnLst>
+                        <p:par>
+                          <p:cTn id="4" fill="hold">
+                            <p:stCondLst>
+                              <p:cond delay="0"/>
+                            </p:stCondLst>
+                            <p:childTnLst>
+                              <p:par>
+                                <p:cTn id="5" presetID="10" presetClass="entr" presetSubtype="0" fill="hold" nodeType="clickEffect">
+                                  <p:stCondLst>
+                                    <p:cond delay="0"/>
+                                  </p:stCondLst>
+                                  <p:childTnLst>
+                                    <p:set>
+                                      <p:cBhvr>
+                                        <p:cTn id="6" dur="1" fill="hold">
+                                          <p:stCondLst>
+                                            <p:cond delay="0"/>
+                                          </p:stCondLst>
+                                        </p:cTn>
+                                        <p:tgtEl>
+                                          <p:spTgt spid="13"/>
+                                        </p:tgtEl>
+                                        <p:attrNameLst>
+                                          <p:attrName>style.visibility</p:attrName>
+                                        </p:attrNameLst>
+                                      </p:cBhvr>
+                                      <p:to>
+                                        <p:strVal val="visible"/>
+                                      </p:to>
+                                    </p:set>
+                                    <p:animEffect transition="in" filter="fade">
+                                      <p:cBhvr>
+                                        <p:cTn id="7" dur="500"/>
+                                        <p:tgtEl>
+                                          <p:spTgt spid="13"/>
+                                        </p:tgtEl>
+                                      </p:cBhvr>
+                                    </p:animEffect>
+                                  </p:childTnLst>
+                                </p:cTn>
+                              </p:par>
+                            </p:childTnLst>
+                          </p:cTn>
+                        </p:par>
+                      </p:childTnLst>
+                    </p:cTn>
+                  </p:par>
+                </p:childTnLst>
+              </p:cTn>
+              <p:prevCondLst>
+                <p:cond evt="onPrev" delay="0">
+                  <p:tgtEl>
+                    <p:sldTgt/>
+                  </p:tgtEl>
+                </p:cond>
+              </p:prevCondLst>
+              <p:nextCondLst>
+                <p:cond evt="onNext" delay="0">
+                  <p:tgtEl>
+                    <p:sldTgt/>
+                  </p:tgtEl>
+                </p:cond>
+              </p:nextCondLst>
+            </p:seq>
+          </p:childTnLst>
+        </p:cTn>
+      </p:par>
+    </p:tnLst>
+  </p:timing>
+</p:sld>
+</file>
+
+<file path=ppt/slides/slide13.xml><?xml version="1.0" encoding="utf-8"?>
+<p:sld xmlns:a="http://schemas.openxmlformats.org/drawingml/2006/main" xmlns:r="http://schemas.openxmlformats.org/officeDocument/2006/relationships" xmlns:p="http://schemas.openxmlformats.org/presentationml/2006/main">
+  <p:cSld>
+    <p:spTree>
+      <p:nvGrpSpPr>
+        <p:cNvPr id="1" name=""/>
+        <p:cNvGrpSpPr/>
+        <p:nvPr/>
+      </p:nvGrpSpPr>
+      <p:grpSpPr>
+        <a:xfrm>
+          <a:off x="0" y="0"/>
+          <a:ext cx="0" cy="0"/>
+          <a:chOff x="0" y="0"/>
+          <a:chExt cx="0" cy="0"/>
+        </a:xfrm>
+      </p:grpSpPr>
+      <p:sp>
+        <p:nvSpPr>
+          <p:cNvPr id="4" name="TextBox 3">
+            <a:extLst>
+              <a:ext uri="{FF2B5EF4-FFF2-40B4-BE49-F238E27FC236}">
+                <a16:creationId xmlns:a16="http://schemas.microsoft.com/office/drawing/2014/main" id="{2676B0D9-ED59-4164-BC32-8840B2788507}"/>
+              </a:ext>
+            </a:extLst>
+          </p:cNvPr>
+          <p:cNvSpPr txBox="1"/>
+          <p:nvPr/>
+        </p:nvSpPr>
+        <p:spPr>
+          <a:xfrm>
             <a:off x="4607451" y="694891"/>
             <a:ext cx="2977097" cy="430887"/>
           </a:xfrm>
@@ -4909,7 +5731,7 @@
 </p:sld>
 </file>
 
-<file path=ppt/slides/slide12.xml><?xml version="1.0" encoding="utf-8"?>
+<file path=ppt/slides/slide14.xml><?xml version="1.0" encoding="utf-8"?>
 <p:sld xmlns:a="http://schemas.openxmlformats.org/drawingml/2006/main" xmlns:r="http://schemas.openxmlformats.org/officeDocument/2006/relationships" xmlns:p="http://schemas.openxmlformats.org/presentationml/2006/main">
   <p:cSld>
     <p:spTree>
@@ -6756,10 +7578,10 @@
       </p:grpSpPr>
       <p:sp>
         <p:nvSpPr>
-          <p:cNvPr id="4" name="TextBox 3">
-            <a:extLst>
-              <a:ext uri="{FF2B5EF4-FFF2-40B4-BE49-F238E27FC236}">
-                <a16:creationId xmlns:a16="http://schemas.microsoft.com/office/drawing/2014/main" id="{2676B0D9-ED59-4164-BC32-8840B2788507}"/>
+          <p:cNvPr id="2" name="TextBox 1">
+            <a:extLst>
+              <a:ext uri="{FF2B5EF4-FFF2-40B4-BE49-F238E27FC236}">
+                <a16:creationId xmlns:a16="http://schemas.microsoft.com/office/drawing/2014/main" id="{AC93263C-E024-4545-8846-C215D9ECA443}"/>
               </a:ext>
             </a:extLst>
           </p:cNvPr>
@@ -6768,8 +7590,8 @@
         </p:nvSpPr>
         <p:spPr>
           <a:xfrm>
-            <a:off x="5302698" y="681037"/>
-            <a:ext cx="1249060" cy="430887"/>
+            <a:off x="4184258" y="306965"/>
+            <a:ext cx="3823483" cy="430887"/>
           </a:xfrm>
           <a:prstGeom prst="rect">
             <a:avLst/>
@@ -6789,144 +7611,27 @@
                 </a:solidFill>
                 <a:latin typeface="Montserrat" panose="00000500000000000000" pitchFamily="2" charset="0"/>
               </a:rPr>
-              <a:t>Coding</a:t>
-            </a:r>
-          </a:p>
-        </p:txBody>
-      </p:sp>
-      <p:pic>
-        <p:nvPicPr>
-          <p:cNvPr id="5" name="Picture 4">
-            <a:extLst>
-              <a:ext uri="{FF2B5EF4-FFF2-40B4-BE49-F238E27FC236}">
-                <a16:creationId xmlns:a16="http://schemas.microsoft.com/office/drawing/2014/main" id="{734E72FC-E1A7-4C5C-B5FA-16669EE5C948}"/>
-              </a:ext>
-            </a:extLst>
-          </p:cNvPr>
-          <p:cNvPicPr>
-            <a:picLocks noChangeAspect="1"/>
-          </p:cNvPicPr>
+              <a:t>Programming Language</a:t>
+            </a:r>
+          </a:p>
+        </p:txBody>
+      </p:sp>
+      <p:sp>
+        <p:nvSpPr>
+          <p:cNvPr id="3" name="TextBox 2">
+            <a:extLst>
+              <a:ext uri="{FF2B5EF4-FFF2-40B4-BE49-F238E27FC236}">
+                <a16:creationId xmlns:a16="http://schemas.microsoft.com/office/drawing/2014/main" id="{314C66C5-1F02-4E44-85E7-24A8B220EDCF}"/>
+              </a:ext>
+            </a:extLst>
+          </p:cNvPr>
+          <p:cNvSpPr txBox="1"/>
           <p:nvPr/>
-        </p:nvPicPr>
-        <p:blipFill>
-          <a:blip r:embed="rId2">
-            <a:extLst>
-              <a:ext uri="{28A0092B-C50C-407E-A947-70E740481C1C}">
-                <a14:useLocalDpi xmlns:a14="http://schemas.microsoft.com/office/drawing/2010/main" val="0"/>
-              </a:ext>
-            </a:extLst>
-          </a:blip>
-          <a:stretch>
-            <a:fillRect/>
-          </a:stretch>
-        </p:blipFill>
+        </p:nvSpPr>
         <p:spPr>
           <a:xfrm>
-            <a:off x="8707582" y="2495853"/>
-            <a:ext cx="2509575" cy="2509575"/>
-          </a:xfrm>
-          <a:prstGeom prst="rect">
-            <a:avLst/>
-          </a:prstGeom>
-        </p:spPr>
-      </p:pic>
-      <p:pic>
-        <p:nvPicPr>
-          <p:cNvPr id="7" name="Picture 6">
-            <a:extLst>
-              <a:ext uri="{FF2B5EF4-FFF2-40B4-BE49-F238E27FC236}">
-                <a16:creationId xmlns:a16="http://schemas.microsoft.com/office/drawing/2014/main" id="{0FC344B0-E20B-4240-A114-FA26C3420C11}"/>
-              </a:ext>
-            </a:extLst>
-          </p:cNvPr>
-          <p:cNvPicPr>
-            <a:picLocks noChangeAspect="1"/>
-          </p:cNvPicPr>
-          <p:nvPr/>
-        </p:nvPicPr>
-        <p:blipFill>
-          <a:blip r:embed="rId3">
-            <a:extLst>
-              <a:ext uri="{28A0092B-C50C-407E-A947-70E740481C1C}">
-                <a14:useLocalDpi xmlns:a14="http://schemas.microsoft.com/office/drawing/2010/main" val="0"/>
-              </a:ext>
-            </a:extLst>
-          </a:blip>
-          <a:stretch>
-            <a:fillRect/>
-          </a:stretch>
-        </p:blipFill>
-        <p:spPr>
-          <a:xfrm>
-            <a:off x="1562793" y="2495853"/>
-            <a:ext cx="1104702" cy="2666522"/>
-          </a:xfrm>
-          <a:prstGeom prst="rect">
-            <a:avLst/>
-          </a:prstGeom>
-        </p:spPr>
-      </p:pic>
-      <p:cxnSp>
-        <p:nvCxnSpPr>
-          <p:cNvPr id="8" name="Straight Arrow Connector 7">
-            <a:extLst>
-              <a:ext uri="{FF2B5EF4-FFF2-40B4-BE49-F238E27FC236}">
-                <a16:creationId xmlns:a16="http://schemas.microsoft.com/office/drawing/2014/main" id="{93CDEECC-1BA2-4107-A867-6A6A3FF92D31}"/>
-              </a:ext>
-            </a:extLst>
-          </p:cNvPr>
-          <p:cNvCxnSpPr>
-            <a:cxnSpLocks/>
-          </p:cNvCxnSpPr>
-          <p:nvPr/>
-        </p:nvCxnSpPr>
-        <p:spPr>
-          <a:xfrm>
-            <a:off x="3484419" y="3546764"/>
-            <a:ext cx="4509654" cy="0"/>
-          </a:xfrm>
-          <a:prstGeom prst="straightConnector1">
-            <a:avLst/>
-          </a:prstGeom>
-          <a:ln w="76200">
-            <a:solidFill>
-              <a:schemeClr val="tx1"/>
-            </a:solidFill>
-            <a:prstDash val="dash"/>
-            <a:tailEnd type="triangle"/>
-          </a:ln>
-        </p:spPr>
-        <p:style>
-          <a:lnRef idx="1">
-            <a:schemeClr val="dk1"/>
-          </a:lnRef>
-          <a:fillRef idx="0">
-            <a:schemeClr val="dk1"/>
-          </a:fillRef>
-          <a:effectRef idx="0">
-            <a:schemeClr val="dk1"/>
-          </a:effectRef>
-          <a:fontRef idx="minor">
-            <a:schemeClr val="tx1"/>
-          </a:fontRef>
-        </p:style>
-      </p:cxnSp>
-      <p:sp>
-        <p:nvSpPr>
-          <p:cNvPr id="12" name="TextBox 11">
-            <a:extLst>
-              <a:ext uri="{FF2B5EF4-FFF2-40B4-BE49-F238E27FC236}">
-                <a16:creationId xmlns:a16="http://schemas.microsoft.com/office/drawing/2014/main" id="{94420BDD-3CDA-475B-96C7-13A37E2B22CB}"/>
-              </a:ext>
-            </a:extLst>
-          </p:cNvPr>
-          <p:cNvSpPr txBox="1"/>
-          <p:nvPr/>
-        </p:nvSpPr>
-        <p:spPr>
-          <a:xfrm>
-            <a:off x="5043055" y="3059668"/>
-            <a:ext cx="1856509" cy="369332"/>
+            <a:off x="637308" y="1866900"/>
+            <a:ext cx="10917382" cy="2139047"/>
           </a:xfrm>
           <a:prstGeom prst="rect">
             <a:avLst/>
@@ -6934,127 +7639,45 @@
           <a:noFill/>
         </p:spPr>
         <p:txBody>
-          <a:bodyPr wrap="square" rtlCol="0">
+          <a:bodyPr wrap="square">
             <a:spAutoFit/>
           </a:bodyPr>
           <a:lstStyle/>
           <a:p>
-            <a:r>
-              <a:rPr lang="en-US" b="1" dirty="0"/>
-              <a:t>Instruction/Code</a:t>
-            </a:r>
-          </a:p>
-        </p:txBody>
-      </p:sp>
-      <p:grpSp>
-        <p:nvGrpSpPr>
-          <p:cNvPr id="13" name="Group 12">
-            <a:extLst>
-              <a:ext uri="{FF2B5EF4-FFF2-40B4-BE49-F238E27FC236}">
-                <a16:creationId xmlns:a16="http://schemas.microsoft.com/office/drawing/2014/main" id="{CD4B1333-4D4A-4050-8534-F7DB2E1D15F1}"/>
-              </a:ext>
-            </a:extLst>
-          </p:cNvPr>
-          <p:cNvGrpSpPr/>
-          <p:nvPr/>
-        </p:nvGrpSpPr>
-        <p:grpSpPr>
-          <a:xfrm>
-            <a:off x="3646951" y="5562851"/>
-            <a:ext cx="4862945" cy="568020"/>
-            <a:chOff x="3646951" y="5562851"/>
-            <a:chExt cx="4862945" cy="568020"/>
-          </a:xfrm>
-        </p:grpSpPr>
-        <p:sp>
-          <p:nvSpPr>
-            <p:cNvPr id="14" name="Double Brace 13">
-              <a:extLst>
-                <a:ext uri="{FF2B5EF4-FFF2-40B4-BE49-F238E27FC236}">
-                  <a16:creationId xmlns:a16="http://schemas.microsoft.com/office/drawing/2014/main" id="{620F8BF4-9744-4DDB-8979-D96C5359B56E}"/>
-                </a:ext>
-              </a:extLst>
-            </p:cNvPr>
-            <p:cNvSpPr/>
-            <p:nvPr/>
-          </p:nvSpPr>
-          <p:spPr>
-            <a:xfrm>
-              <a:off x="3646951" y="5562851"/>
-              <a:ext cx="4862945" cy="568020"/>
-            </a:xfrm>
-            <a:prstGeom prst="bracePair">
-              <a:avLst/>
-            </a:prstGeom>
-            <a:ln w="38100">
-              <a:solidFill>
-                <a:srgbClr val="FF9000"/>
-              </a:solidFill>
-            </a:ln>
-          </p:spPr>
-          <p:style>
-            <a:lnRef idx="1">
-              <a:schemeClr val="accent1"/>
-            </a:lnRef>
-            <a:fillRef idx="0">
-              <a:schemeClr val="accent1"/>
-            </a:fillRef>
-            <a:effectRef idx="0">
-              <a:schemeClr val="accent1"/>
-            </a:effectRef>
-            <a:fontRef idx="minor">
-              <a:schemeClr val="tx1"/>
-            </a:fontRef>
-          </p:style>
-          <p:txBody>
-            <a:bodyPr rtlCol="0" anchor="ctr"/>
-            <a:lstStyle/>
-            <a:p>
-              <a:pPr algn="ctr"/>
-              <a:endParaRPr lang="en-US"/>
-            </a:p>
-          </p:txBody>
-        </p:sp>
-        <p:sp>
-          <p:nvSpPr>
-            <p:cNvPr id="15" name="TextBox 14">
-              <a:extLst>
-                <a:ext uri="{FF2B5EF4-FFF2-40B4-BE49-F238E27FC236}">
-                  <a16:creationId xmlns:a16="http://schemas.microsoft.com/office/drawing/2014/main" id="{70D4B29C-8242-44E1-9967-7D3BAF5FF219}"/>
-                </a:ext>
-              </a:extLst>
-            </p:cNvPr>
-            <p:cNvSpPr txBox="1"/>
-            <p:nvPr/>
-          </p:nvSpPr>
-          <p:spPr>
-            <a:xfrm>
-              <a:off x="3819639" y="5681600"/>
-              <a:ext cx="4513608" cy="369332"/>
-            </a:xfrm>
-            <a:prstGeom prst="rect">
-              <a:avLst/>
-            </a:prstGeom>
-            <a:noFill/>
-          </p:spPr>
-          <p:txBody>
-            <a:bodyPr wrap="none" rtlCol="0">
-              <a:spAutoFit/>
-            </a:bodyPr>
-            <a:lstStyle/>
-            <a:p>
-              <a:r>
-                <a:rPr lang="en-US" dirty="0"/>
-                <a:t>Human attempts to write English to Computer</a:t>
-              </a:r>
-            </a:p>
-          </p:txBody>
-        </p:sp>
-      </p:grpSp>
+            <a:pPr algn="ctr"/>
+            <a:r>
+              <a:rPr lang="en-US" sz="11500" dirty="0">
+                <a:solidFill>
+                  <a:srgbClr val="FF9000"/>
+                </a:solidFill>
+                <a:latin typeface="Montserrat" panose="00000500000000000000" pitchFamily="2" charset="0"/>
+              </a:rPr>
+              <a:t>“</a:t>
+            </a:r>
+            <a:r>
+              <a:rPr lang="en-US" dirty="0">
+                <a:latin typeface="open sans" panose="020B0606030504020204" pitchFamily="34" charset="0"/>
+                <a:ea typeface="open sans" panose="020B0606030504020204" pitchFamily="34" charset="0"/>
+                <a:cs typeface="open sans" panose="020B0606030504020204" pitchFamily="34" charset="0"/>
+              </a:rPr>
+              <a:t>A programming language is a vocabulary and set of grammatical rules for instructing a computer or computing device to perform specific tasks</a:t>
+            </a:r>
+            <a:r>
+              <a:rPr lang="en-US" dirty="0"/>
+              <a:t>.</a:t>
+            </a:r>
+            <a:endParaRPr lang="en-US" dirty="0">
+              <a:latin typeface="open sans" panose="020B0606030504020204" pitchFamily="34" charset="0"/>
+              <a:ea typeface="open sans" panose="020B0606030504020204" pitchFamily="34" charset="0"/>
+              <a:cs typeface="open sans" panose="020B0606030504020204" pitchFamily="34" charset="0"/>
+            </a:endParaRPr>
+          </a:p>
+        </p:txBody>
+      </p:sp>
     </p:spTree>
     <p:extLst>
       <p:ext uri="{BB962C8B-B14F-4D97-AF65-F5344CB8AC3E}">
-        <p14:creationId xmlns:p14="http://schemas.microsoft.com/office/powerpoint/2010/main" val="1027035372"/>
+        <p14:creationId xmlns:p14="http://schemas.microsoft.com/office/powerpoint/2010/main" val="3586667027"/>
       </p:ext>
     </p:extLst>
   </p:cSld>
@@ -7082,7 +7705,7 @@
                             </p:stCondLst>
                             <p:childTnLst>
                               <p:par>
-                                <p:cTn id="5" presetID="10" presetClass="entr" presetSubtype="0" fill="hold" nodeType="clickEffect">
+                                <p:cTn id="5" presetID="10" presetClass="entr" presetSubtype="0" fill="hold" grpId="0" nodeType="clickEffect">
                                   <p:stCondLst>
                                     <p:cond delay="0"/>
                                   </p:stCondLst>
@@ -7095,7 +7718,7 @@
                                           </p:stCondLst>
                                         </p:cTn>
                                         <p:tgtEl>
-                                          <p:spTgt spid="13"/>
+                                          <p:spTgt spid="3"/>
                                         </p:tgtEl>
                                         <p:attrNameLst>
                                           <p:attrName>style.visibility</p:attrName>
@@ -7109,7 +7732,7 @@
                                       <p:cBhvr>
                                         <p:cTn id="7" dur="500"/>
                                         <p:tgtEl>
-                                          <p:spTgt spid="13"/>
+                                          <p:spTgt spid="3"/>
                                         </p:tgtEl>
                                       </p:cBhvr>
                                     </p:animEffect>
@@ -7143,6 +7766,9 @@
         </p:cTn>
       </p:par>
     </p:tnLst>
+    <p:bldLst>
+      <p:bldP spid="3" grpId="0"/>
+    </p:bldLst>
   </p:timing>
 </p:sld>
 </file>
@@ -7166,10 +7792,10 @@
       </p:grpSpPr>
       <p:sp>
         <p:nvSpPr>
-          <p:cNvPr id="4" name="TextBox 3">
-            <a:extLst>
-              <a:ext uri="{FF2B5EF4-FFF2-40B4-BE49-F238E27FC236}">
-                <a16:creationId xmlns:a16="http://schemas.microsoft.com/office/drawing/2014/main" id="{2676B0D9-ED59-4164-BC32-8840B2788507}"/>
+          <p:cNvPr id="2" name="TextBox 1">
+            <a:extLst>
+              <a:ext uri="{FF2B5EF4-FFF2-40B4-BE49-F238E27FC236}">
+                <a16:creationId xmlns:a16="http://schemas.microsoft.com/office/drawing/2014/main" id="{36F0527E-EC4C-420F-B25F-E6335C4B1A5E}"/>
               </a:ext>
             </a:extLst>
           </p:cNvPr>
@@ -7178,8 +7804,8 @@
         </p:nvSpPr>
         <p:spPr>
           <a:xfrm>
-            <a:off x="5302698" y="681037"/>
-            <a:ext cx="1249060" cy="430887"/>
+            <a:off x="5084804" y="182274"/>
+            <a:ext cx="1619354" cy="430887"/>
           </a:xfrm>
           <a:prstGeom prst="rect">
             <a:avLst/>
@@ -7199,144 +7825,27 @@
                 </a:solidFill>
                 <a:latin typeface="Montserrat" panose="00000500000000000000" pitchFamily="2" charset="0"/>
               </a:rPr>
-              <a:t>Coding</a:t>
-            </a:r>
-          </a:p>
-        </p:txBody>
-      </p:sp>
-      <p:pic>
-        <p:nvPicPr>
-          <p:cNvPr id="5" name="Picture 4">
-            <a:extLst>
-              <a:ext uri="{FF2B5EF4-FFF2-40B4-BE49-F238E27FC236}">
-                <a16:creationId xmlns:a16="http://schemas.microsoft.com/office/drawing/2014/main" id="{734E72FC-E1A7-4C5C-B5FA-16669EE5C948}"/>
-              </a:ext>
-            </a:extLst>
-          </p:cNvPr>
-          <p:cNvPicPr>
-            <a:picLocks noChangeAspect="1"/>
-          </p:cNvPicPr>
+              <a:t>Examples</a:t>
+            </a:r>
+          </a:p>
+        </p:txBody>
+      </p:sp>
+      <p:sp>
+        <p:nvSpPr>
+          <p:cNvPr id="4" name="TextBox 3">
+            <a:extLst>
+              <a:ext uri="{FF2B5EF4-FFF2-40B4-BE49-F238E27FC236}">
+                <a16:creationId xmlns:a16="http://schemas.microsoft.com/office/drawing/2014/main" id="{03B50932-9A0F-43D0-9749-956CF1D2AD16}"/>
+              </a:ext>
+            </a:extLst>
+          </p:cNvPr>
+          <p:cNvSpPr txBox="1"/>
           <p:nvPr/>
-        </p:nvPicPr>
-        <p:blipFill>
-          <a:blip r:embed="rId2">
-            <a:extLst>
-              <a:ext uri="{28A0092B-C50C-407E-A947-70E740481C1C}">
-                <a14:useLocalDpi xmlns:a14="http://schemas.microsoft.com/office/drawing/2010/main" val="0"/>
-              </a:ext>
-            </a:extLst>
-          </a:blip>
-          <a:stretch>
-            <a:fillRect/>
-          </a:stretch>
-        </p:blipFill>
+        </p:nvSpPr>
         <p:spPr>
           <a:xfrm>
-            <a:off x="8707582" y="2495853"/>
-            <a:ext cx="2509575" cy="2509575"/>
-          </a:xfrm>
-          <a:prstGeom prst="rect">
-            <a:avLst/>
-          </a:prstGeom>
-        </p:spPr>
-      </p:pic>
-      <p:pic>
-        <p:nvPicPr>
-          <p:cNvPr id="7" name="Picture 6">
-            <a:extLst>
-              <a:ext uri="{FF2B5EF4-FFF2-40B4-BE49-F238E27FC236}">
-                <a16:creationId xmlns:a16="http://schemas.microsoft.com/office/drawing/2014/main" id="{0FC344B0-E20B-4240-A114-FA26C3420C11}"/>
-              </a:ext>
-            </a:extLst>
-          </p:cNvPr>
-          <p:cNvPicPr>
-            <a:picLocks noChangeAspect="1"/>
-          </p:cNvPicPr>
-          <p:nvPr/>
-        </p:nvPicPr>
-        <p:blipFill>
-          <a:blip r:embed="rId3">
-            <a:extLst>
-              <a:ext uri="{28A0092B-C50C-407E-A947-70E740481C1C}">
-                <a14:useLocalDpi xmlns:a14="http://schemas.microsoft.com/office/drawing/2010/main" val="0"/>
-              </a:ext>
-            </a:extLst>
-          </a:blip>
-          <a:stretch>
-            <a:fillRect/>
-          </a:stretch>
-        </p:blipFill>
-        <p:spPr>
-          <a:xfrm>
-            <a:off x="1562793" y="2495853"/>
-            <a:ext cx="1104702" cy="2666522"/>
-          </a:xfrm>
-          <a:prstGeom prst="rect">
-            <a:avLst/>
-          </a:prstGeom>
-        </p:spPr>
-      </p:pic>
-      <p:cxnSp>
-        <p:nvCxnSpPr>
-          <p:cNvPr id="8" name="Straight Arrow Connector 7">
-            <a:extLst>
-              <a:ext uri="{FF2B5EF4-FFF2-40B4-BE49-F238E27FC236}">
-                <a16:creationId xmlns:a16="http://schemas.microsoft.com/office/drawing/2014/main" id="{93CDEECC-1BA2-4107-A867-6A6A3FF92D31}"/>
-              </a:ext>
-            </a:extLst>
-          </p:cNvPr>
-          <p:cNvCxnSpPr>
-            <a:cxnSpLocks/>
-          </p:cNvCxnSpPr>
-          <p:nvPr/>
-        </p:nvCxnSpPr>
-        <p:spPr>
-          <a:xfrm>
-            <a:off x="3484419" y="3546764"/>
-            <a:ext cx="4509654" cy="0"/>
-          </a:xfrm>
-          <a:prstGeom prst="straightConnector1">
-            <a:avLst/>
-          </a:prstGeom>
-          <a:ln w="76200">
-            <a:solidFill>
-              <a:schemeClr val="tx1"/>
-            </a:solidFill>
-            <a:prstDash val="dash"/>
-            <a:tailEnd type="triangle"/>
-          </a:ln>
-        </p:spPr>
-        <p:style>
-          <a:lnRef idx="1">
-            <a:schemeClr val="dk1"/>
-          </a:lnRef>
-          <a:fillRef idx="0">
-            <a:schemeClr val="dk1"/>
-          </a:fillRef>
-          <a:effectRef idx="0">
-            <a:schemeClr val="dk1"/>
-          </a:effectRef>
-          <a:fontRef idx="minor">
-            <a:schemeClr val="tx1"/>
-          </a:fontRef>
-        </p:style>
-      </p:cxnSp>
-      <p:sp>
-        <p:nvSpPr>
-          <p:cNvPr id="12" name="TextBox 11">
-            <a:extLst>
-              <a:ext uri="{FF2B5EF4-FFF2-40B4-BE49-F238E27FC236}">
-                <a16:creationId xmlns:a16="http://schemas.microsoft.com/office/drawing/2014/main" id="{94420BDD-3CDA-475B-96C7-13A37E2B22CB}"/>
-              </a:ext>
-            </a:extLst>
-          </p:cNvPr>
-          <p:cNvSpPr txBox="1"/>
-          <p:nvPr/>
-        </p:nvSpPr>
-        <p:spPr>
-          <a:xfrm>
-            <a:off x="5043055" y="3059668"/>
-            <a:ext cx="1856509" cy="369332"/>
+            <a:off x="1676400" y="929533"/>
+            <a:ext cx="6096000" cy="4998933"/>
           </a:xfrm>
           <a:prstGeom prst="rect">
             <a:avLst/>
@@ -7344,216 +7853,233 @@
           <a:noFill/>
         </p:spPr>
         <p:txBody>
-          <a:bodyPr wrap="square" rtlCol="0">
+          <a:bodyPr wrap="square">
             <a:spAutoFit/>
           </a:bodyPr>
           <a:lstStyle/>
           <a:p>
-            <a:r>
-              <a:rPr lang="en-US" b="1" dirty="0"/>
-              <a:t>Instruction/Code</a:t>
-            </a:r>
-          </a:p>
-        </p:txBody>
-      </p:sp>
-      <p:grpSp>
-        <p:nvGrpSpPr>
-          <p:cNvPr id="13" name="Group 12">
-            <a:extLst>
-              <a:ext uri="{FF2B5EF4-FFF2-40B4-BE49-F238E27FC236}">
-                <a16:creationId xmlns:a16="http://schemas.microsoft.com/office/drawing/2014/main" id="{CD4B1333-4D4A-4050-8534-F7DB2E1D15F1}"/>
-              </a:ext>
-            </a:extLst>
-          </p:cNvPr>
-          <p:cNvGrpSpPr/>
-          <p:nvPr/>
-        </p:nvGrpSpPr>
-        <p:grpSpPr>
-          <a:xfrm>
-            <a:off x="3311236" y="5608944"/>
-            <a:ext cx="5709851" cy="568020"/>
-            <a:chOff x="3646951" y="5562851"/>
-            <a:chExt cx="5007959" cy="568020"/>
-          </a:xfrm>
-        </p:grpSpPr>
-        <p:sp>
-          <p:nvSpPr>
-            <p:cNvPr id="14" name="Double Brace 13">
-              <a:extLst>
-                <a:ext uri="{FF2B5EF4-FFF2-40B4-BE49-F238E27FC236}">
-                  <a16:creationId xmlns:a16="http://schemas.microsoft.com/office/drawing/2014/main" id="{620F8BF4-9744-4DDB-8979-D96C5359B56E}"/>
-                </a:ext>
-              </a:extLst>
-            </p:cNvPr>
-            <p:cNvSpPr/>
-            <p:nvPr/>
-          </p:nvSpPr>
-          <p:spPr>
-            <a:xfrm>
-              <a:off x="3646951" y="5562851"/>
-              <a:ext cx="4862945" cy="568020"/>
-            </a:xfrm>
-            <a:prstGeom prst="bracePair">
-              <a:avLst/>
-            </a:prstGeom>
-            <a:ln w="38100">
+            <a:pPr marL="285750" indent="-285750">
+              <a:lnSpc>
+                <a:spcPct val="200000"/>
+              </a:lnSpc>
+              <a:buClr>
+                <a:srgbClr val="FF9000"/>
+              </a:buClr>
+              <a:buFont typeface="Wingdings" panose="05000000000000000000" pitchFamily="2" charset="2"/>
+              <a:buChar char="q"/>
+            </a:pPr>
+            <a:r>
+              <a:rPr lang="en-US" b="0" i="0" dirty="0">
+                <a:solidFill>
+                  <a:srgbClr val="202124"/>
+                </a:solidFill>
+                <a:effectLst/>
+                <a:latin typeface="arial" panose="020B0604020202020204" pitchFamily="34" charset="0"/>
+              </a:rPr>
+              <a:t>Python</a:t>
+            </a:r>
+          </a:p>
+          <a:p>
+            <a:pPr marL="285750" indent="-285750">
+              <a:lnSpc>
+                <a:spcPct val="200000"/>
+              </a:lnSpc>
+              <a:buClr>
+                <a:srgbClr val="FF9000"/>
+              </a:buClr>
+              <a:buFont typeface="Wingdings" panose="05000000000000000000" pitchFamily="2" charset="2"/>
+              <a:buChar char="q"/>
+            </a:pPr>
+            <a:r>
+              <a:rPr lang="en-US" b="0" i="0" dirty="0">
+                <a:solidFill>
+                  <a:srgbClr val="202124"/>
+                </a:solidFill>
+                <a:effectLst/>
+                <a:latin typeface="arial" panose="020B0604020202020204" pitchFamily="34" charset="0"/>
+              </a:rPr>
+              <a:t>BASIC</a:t>
+            </a:r>
+            <a:endParaRPr lang="en-US" dirty="0">
               <a:solidFill>
+                <a:srgbClr val="202124"/>
+              </a:solidFill>
+              <a:latin typeface="arial" panose="020B0604020202020204" pitchFamily="34" charset="0"/>
+            </a:endParaRPr>
+          </a:p>
+          <a:p>
+            <a:pPr marL="285750" indent="-285750">
+              <a:lnSpc>
+                <a:spcPct val="200000"/>
+              </a:lnSpc>
+              <a:buClr>
                 <a:srgbClr val="FF9000"/>
+              </a:buClr>
+              <a:buFont typeface="Wingdings" panose="05000000000000000000" pitchFamily="2" charset="2"/>
+              <a:buChar char="q"/>
+            </a:pPr>
+            <a:r>
+              <a:rPr lang="en-US" b="0" i="0" dirty="0">
+                <a:solidFill>
+                  <a:srgbClr val="202124"/>
+                </a:solidFill>
+                <a:effectLst/>
+                <a:latin typeface="arial" panose="020B0604020202020204" pitchFamily="34" charset="0"/>
+              </a:rPr>
+              <a:t>C</a:t>
+            </a:r>
+          </a:p>
+          <a:p>
+            <a:pPr marL="285750" indent="-285750">
+              <a:lnSpc>
+                <a:spcPct val="200000"/>
+              </a:lnSpc>
+              <a:buClr>
+                <a:srgbClr val="FF9000"/>
+              </a:buClr>
+              <a:buFont typeface="Wingdings" panose="05000000000000000000" pitchFamily="2" charset="2"/>
+              <a:buChar char="q"/>
+            </a:pPr>
+            <a:r>
+              <a:rPr lang="en-US" b="0" i="0" dirty="0">
+                <a:solidFill>
+                  <a:srgbClr val="202124"/>
+                </a:solidFill>
+                <a:effectLst/>
+                <a:latin typeface="arial" panose="020B0604020202020204" pitchFamily="34" charset="0"/>
+              </a:rPr>
+              <a:t>C++</a:t>
+            </a:r>
+          </a:p>
+          <a:p>
+            <a:pPr marL="285750" indent="-285750">
+              <a:lnSpc>
+                <a:spcPct val="200000"/>
+              </a:lnSpc>
+              <a:buClr>
+                <a:srgbClr val="FF9000"/>
+              </a:buClr>
+              <a:buFont typeface="Wingdings" panose="05000000000000000000" pitchFamily="2" charset="2"/>
+              <a:buChar char="q"/>
+            </a:pPr>
+            <a:r>
+              <a:rPr lang="en-US" b="0" i="0" dirty="0">
+                <a:solidFill>
+                  <a:srgbClr val="202124"/>
+                </a:solidFill>
+                <a:effectLst/>
+                <a:latin typeface="arial" panose="020B0604020202020204" pitchFamily="34" charset="0"/>
+              </a:rPr>
+              <a:t>COBOL</a:t>
+            </a:r>
+          </a:p>
+          <a:p>
+            <a:pPr marL="285750" indent="-285750">
+              <a:lnSpc>
+                <a:spcPct val="200000"/>
+              </a:lnSpc>
+              <a:buClr>
+                <a:srgbClr val="FF9000"/>
+              </a:buClr>
+              <a:buFont typeface="Wingdings" panose="05000000000000000000" pitchFamily="2" charset="2"/>
+              <a:buChar char="q"/>
+            </a:pPr>
+            <a:r>
+              <a:rPr lang="en-US" b="0" i="0" dirty="0">
+                <a:solidFill>
+                  <a:srgbClr val="202124"/>
+                </a:solidFill>
+                <a:effectLst/>
+                <a:latin typeface="arial" panose="020B0604020202020204" pitchFamily="34" charset="0"/>
+              </a:rPr>
+              <a:t>Java</a:t>
+            </a:r>
+          </a:p>
+          <a:p>
+            <a:pPr marL="285750" indent="-285750">
+              <a:lnSpc>
+                <a:spcPct val="200000"/>
+              </a:lnSpc>
+              <a:buClr>
+                <a:srgbClr val="FF9000"/>
+              </a:buClr>
+              <a:buFont typeface="Wingdings" panose="05000000000000000000" pitchFamily="2" charset="2"/>
+              <a:buChar char="q"/>
+            </a:pPr>
+            <a:r>
+              <a:rPr lang="en-US" b="0" i="0" dirty="0">
+                <a:solidFill>
+                  <a:srgbClr val="202124"/>
+                </a:solidFill>
+                <a:effectLst/>
+                <a:latin typeface="arial" panose="020B0604020202020204" pitchFamily="34" charset="0"/>
+              </a:rPr>
+              <a:t>FORTRAN</a:t>
+            </a:r>
+            <a:endParaRPr lang="en-US" dirty="0">
+              <a:solidFill>
+                <a:srgbClr val="202124"/>
               </a:solidFill>
-            </a:ln>
-          </p:spPr>
-          <p:style>
-            <a:lnRef idx="1">
-              <a:schemeClr val="accent1"/>
-            </a:lnRef>
-            <a:fillRef idx="0">
-              <a:schemeClr val="accent1"/>
-            </a:fillRef>
-            <a:effectRef idx="0">
-              <a:schemeClr val="accent1"/>
-            </a:effectRef>
-            <a:fontRef idx="minor">
-              <a:schemeClr val="tx1"/>
-            </a:fontRef>
-          </p:style>
-          <p:txBody>
-            <a:bodyPr rtlCol="0" anchor="ctr"/>
-            <a:lstStyle/>
-            <a:p>
-              <a:pPr algn="ctr"/>
-              <a:endParaRPr lang="en-US"/>
-            </a:p>
-          </p:txBody>
-        </p:sp>
-        <p:sp>
-          <p:nvSpPr>
-            <p:cNvPr id="15" name="TextBox 14">
-              <a:extLst>
-                <a:ext uri="{FF2B5EF4-FFF2-40B4-BE49-F238E27FC236}">
-                  <a16:creationId xmlns:a16="http://schemas.microsoft.com/office/drawing/2014/main" id="{70D4B29C-8242-44E1-9967-7D3BAF5FF219}"/>
-                </a:ext>
-              </a:extLst>
-            </p:cNvPr>
-            <p:cNvSpPr txBox="1"/>
-            <p:nvPr/>
-          </p:nvSpPr>
-          <p:spPr>
-            <a:xfrm>
-              <a:off x="3910663" y="5662195"/>
-              <a:ext cx="4744247" cy="369332"/>
-            </a:xfrm>
-            <a:prstGeom prst="rect">
-              <a:avLst/>
-            </a:prstGeom>
-            <a:noFill/>
-          </p:spPr>
-          <p:txBody>
-            <a:bodyPr wrap="none" rtlCol="0">
-              <a:spAutoFit/>
-            </a:bodyPr>
-            <a:lstStyle/>
-            <a:p>
-              <a:r>
-                <a:rPr lang="en-US" dirty="0"/>
-                <a:t>Computer does not understand English language</a:t>
-              </a:r>
-            </a:p>
-          </p:txBody>
-        </p:sp>
-      </p:grpSp>
+              <a:latin typeface="arial" panose="020B0604020202020204" pitchFamily="34" charset="0"/>
+            </a:endParaRPr>
+          </a:p>
+          <a:p>
+            <a:pPr marL="285750" indent="-285750">
+              <a:lnSpc>
+                <a:spcPct val="200000"/>
+              </a:lnSpc>
+              <a:buClr>
+                <a:srgbClr val="FF9000"/>
+              </a:buClr>
+              <a:buFont typeface="Wingdings" panose="05000000000000000000" pitchFamily="2" charset="2"/>
+              <a:buChar char="q"/>
+            </a:pPr>
+            <a:r>
+              <a:rPr lang="en-US" b="0" i="0" dirty="0">
+                <a:solidFill>
+                  <a:srgbClr val="202124"/>
+                </a:solidFill>
+                <a:effectLst/>
+                <a:latin typeface="arial" panose="020B0604020202020204" pitchFamily="34" charset="0"/>
+              </a:rPr>
+              <a:t>Ada</a:t>
+            </a:r>
+          </a:p>
+          <a:p>
+            <a:pPr marL="285750" indent="-285750">
+              <a:lnSpc>
+                <a:spcPct val="200000"/>
+              </a:lnSpc>
+              <a:buClr>
+                <a:srgbClr val="FF9000"/>
+              </a:buClr>
+              <a:buFont typeface="Wingdings" panose="05000000000000000000" pitchFamily="2" charset="2"/>
+              <a:buChar char="q"/>
+            </a:pPr>
+            <a:r>
+              <a:rPr lang="en-US" b="0" i="0" dirty="0">
+                <a:solidFill>
+                  <a:srgbClr val="202124"/>
+                </a:solidFill>
+                <a:effectLst/>
+                <a:latin typeface="arial" panose="020B0604020202020204" pitchFamily="34" charset="0"/>
+              </a:rPr>
+              <a:t>Pascal</a:t>
+            </a:r>
+            <a:endParaRPr lang="en-US" dirty="0"/>
+          </a:p>
+        </p:txBody>
+      </p:sp>
     </p:spTree>
     <p:extLst>
       <p:ext uri="{BB962C8B-B14F-4D97-AF65-F5344CB8AC3E}">
-        <p14:creationId xmlns:p14="http://schemas.microsoft.com/office/powerpoint/2010/main" val="2113416708"/>
+        <p14:creationId xmlns:p14="http://schemas.microsoft.com/office/powerpoint/2010/main" val="1767331709"/>
       </p:ext>
     </p:extLst>
   </p:cSld>
   <p:clrMapOvr>
     <a:masterClrMapping/>
   </p:clrMapOvr>
-  <p:timing>
-    <p:tnLst>
-      <p:par>
-        <p:cTn id="1" dur="indefinite" restart="never" nodeType="tmRoot">
-          <p:childTnLst>
-            <p:seq concurrent="1" nextAc="seek">
-              <p:cTn id="2" dur="indefinite" nodeType="mainSeq">
-                <p:childTnLst>
-                  <p:par>
-                    <p:cTn id="3" fill="hold">
-                      <p:stCondLst>
-                        <p:cond delay="indefinite"/>
-                      </p:stCondLst>
-                      <p:childTnLst>
-                        <p:par>
-                          <p:cTn id="4" fill="hold">
-                            <p:stCondLst>
-                              <p:cond delay="0"/>
-                            </p:stCondLst>
-                            <p:childTnLst>
-                              <p:par>
-                                <p:cTn id="5" presetID="10" presetClass="entr" presetSubtype="0" fill="hold" nodeType="clickEffect">
-                                  <p:stCondLst>
-                                    <p:cond delay="0"/>
-                                  </p:stCondLst>
-                                  <p:childTnLst>
-                                    <p:set>
-                                      <p:cBhvr>
-                                        <p:cTn id="6" dur="1" fill="hold">
-                                          <p:stCondLst>
-                                            <p:cond delay="0"/>
-                                          </p:stCondLst>
-                                        </p:cTn>
-                                        <p:tgtEl>
-                                          <p:spTgt spid="13"/>
-                                        </p:tgtEl>
-                                        <p:attrNameLst>
-                                          <p:attrName>style.visibility</p:attrName>
-                                        </p:attrNameLst>
-                                      </p:cBhvr>
-                                      <p:to>
-                                        <p:strVal val="visible"/>
-                                      </p:to>
-                                    </p:set>
-                                    <p:animEffect transition="in" filter="fade">
-                                      <p:cBhvr>
-                                        <p:cTn id="7" dur="500"/>
-                                        <p:tgtEl>
-                                          <p:spTgt spid="13"/>
-                                        </p:tgtEl>
-                                      </p:cBhvr>
-                                    </p:animEffect>
-                                  </p:childTnLst>
-                                </p:cTn>
-                              </p:par>
-                            </p:childTnLst>
-                          </p:cTn>
-                        </p:par>
-                      </p:childTnLst>
-                    </p:cTn>
-                  </p:par>
-                </p:childTnLst>
-              </p:cTn>
-              <p:prevCondLst>
-                <p:cond evt="onPrev" delay="0">
-                  <p:tgtEl>
-                    <p:sldTgt/>
-                  </p:tgtEl>
-                </p:cond>
-              </p:prevCondLst>
-              <p:nextCondLst>
-                <p:cond evt="onNext" delay="0">
-                  <p:tgtEl>
-                    <p:sldTgt/>
-                  </p:tgtEl>
-                </p:cond>
-              </p:nextCondLst>
-            </p:seq>
-          </p:childTnLst>
-        </p:cTn>
-      </p:par>
-    </p:tnLst>
-  </p:timing>
 </p:sld>
 </file>
 

</xml_diff>

<commit_message>
Addition of Slide Edits
</commit_message>
<xml_diff>
--- a/1. Introduction to Program .pptx
+++ b/1. Introduction to Program .pptx
@@ -19,7 +19,6 @@
     <p:sldId id="271" r:id="rId13"/>
     <p:sldId id="272" r:id="rId14"/>
     <p:sldId id="273" r:id="rId15"/>
-    <p:sldId id="277" r:id="rId16"/>
   </p:sldIdLst>
   <p:sldSz cx="12192000" cy="6858000"/>
   <p:notesSz cx="6858000" cy="9144000"/>
@@ -5999,274 +5998,6 @@
     <p:extLst>
       <p:ext uri="{BB962C8B-B14F-4D97-AF65-F5344CB8AC3E}">
         <p14:creationId xmlns:p14="http://schemas.microsoft.com/office/powerpoint/2010/main" val="1081636988"/>
-      </p:ext>
-    </p:extLst>
-  </p:cSld>
-  <p:clrMapOvr>
-    <a:masterClrMapping/>
-  </p:clrMapOvr>
-</p:sld>
-</file>
-
-<file path=ppt/slides/slide15.xml><?xml version="1.0" encoding="utf-8"?>
-<p:sld xmlns:a="http://schemas.openxmlformats.org/drawingml/2006/main" xmlns:r="http://schemas.openxmlformats.org/officeDocument/2006/relationships" xmlns:p="http://schemas.openxmlformats.org/presentationml/2006/main">
-  <p:cSld>
-    <p:spTree>
-      <p:nvGrpSpPr>
-        <p:cNvPr id="1" name=""/>
-        <p:cNvGrpSpPr/>
-        <p:nvPr/>
-      </p:nvGrpSpPr>
-      <p:grpSpPr>
-        <a:xfrm>
-          <a:off x="0" y="0"/>
-          <a:ext cx="0" cy="0"/>
-          <a:chOff x="0" y="0"/>
-          <a:chExt cx="0" cy="0"/>
-        </a:xfrm>
-      </p:grpSpPr>
-      <p:sp>
-        <p:nvSpPr>
-          <p:cNvPr id="2" name="TextBox 1">
-            <a:extLst>
-              <a:ext uri="{FF2B5EF4-FFF2-40B4-BE49-F238E27FC236}">
-                <a16:creationId xmlns:a16="http://schemas.microsoft.com/office/drawing/2014/main" id="{0B35D728-FEA5-4D10-9FA5-122A3DFDF4E9}"/>
-              </a:ext>
-            </a:extLst>
-          </p:cNvPr>
-          <p:cNvSpPr txBox="1"/>
-          <p:nvPr/>
-        </p:nvSpPr>
-        <p:spPr>
-          <a:xfrm>
-            <a:off x="5172510" y="144782"/>
-            <a:ext cx="1321196" cy="430887"/>
-          </a:xfrm>
-          <a:prstGeom prst="rect">
-            <a:avLst/>
-          </a:prstGeom>
-          <a:noFill/>
-        </p:spPr>
-        <p:txBody>
-          <a:bodyPr wrap="none" rtlCol="0">
-            <a:spAutoFit/>
-          </a:bodyPr>
-          <a:lstStyle/>
-          <a:p>
-            <a:r>
-              <a:rPr lang="en-US" sz="2200" b="1" dirty="0">
-                <a:solidFill>
-                  <a:srgbClr val="FF9000"/>
-                </a:solidFill>
-                <a:latin typeface="Montserrat" panose="00000500000000000000" pitchFamily="2" charset="0"/>
-              </a:rPr>
-              <a:t>Activity</a:t>
-            </a:r>
-          </a:p>
-        </p:txBody>
-      </p:sp>
-      <p:pic>
-        <p:nvPicPr>
-          <p:cNvPr id="4" name="Picture 3">
-            <a:extLst>
-              <a:ext uri="{FF2B5EF4-FFF2-40B4-BE49-F238E27FC236}">
-                <a16:creationId xmlns:a16="http://schemas.microsoft.com/office/drawing/2014/main" id="{51C9EBDC-0EB8-45DA-9FC3-98C3EB2230FF}"/>
-              </a:ext>
-            </a:extLst>
-          </p:cNvPr>
-          <p:cNvPicPr>
-            <a:picLocks noChangeAspect="1"/>
-          </p:cNvPicPr>
-          <p:nvPr/>
-        </p:nvPicPr>
-        <p:blipFill>
-          <a:blip r:embed="rId2">
-            <a:extLst>
-              <a:ext uri="{28A0092B-C50C-407E-A947-70E740481C1C}">
-                <a14:useLocalDpi xmlns:a14="http://schemas.microsoft.com/office/drawing/2010/main" val="0"/>
-              </a:ext>
-            </a:extLst>
-          </a:blip>
-          <a:stretch>
-            <a:fillRect/>
-          </a:stretch>
-        </p:blipFill>
-        <p:spPr>
-          <a:xfrm>
-            <a:off x="276730" y="276730"/>
-            <a:ext cx="430887" cy="430887"/>
-          </a:xfrm>
-          <a:prstGeom prst="rect">
-            <a:avLst/>
-          </a:prstGeom>
-        </p:spPr>
-      </p:pic>
-      <p:pic>
-        <p:nvPicPr>
-          <p:cNvPr id="5" name="Picture 4">
-            <a:extLst>
-              <a:ext uri="{FF2B5EF4-FFF2-40B4-BE49-F238E27FC236}">
-                <a16:creationId xmlns:a16="http://schemas.microsoft.com/office/drawing/2014/main" id="{013F46FA-D79B-4876-8DDD-943390651EE6}"/>
-              </a:ext>
-            </a:extLst>
-          </p:cNvPr>
-          <p:cNvPicPr>
-            <a:picLocks noChangeAspect="1"/>
-          </p:cNvPicPr>
-          <p:nvPr/>
-        </p:nvPicPr>
-        <p:blipFill>
-          <a:blip r:embed="rId2">
-            <a:extLst>
-              <a:ext uri="{28A0092B-C50C-407E-A947-70E740481C1C}">
-                <a14:useLocalDpi xmlns:a14="http://schemas.microsoft.com/office/drawing/2010/main" val="0"/>
-              </a:ext>
-            </a:extLst>
-          </a:blip>
-          <a:stretch>
-            <a:fillRect/>
-          </a:stretch>
-        </p:blipFill>
-        <p:spPr>
-          <a:xfrm>
-            <a:off x="11541996" y="6207996"/>
-            <a:ext cx="369786" cy="369786"/>
-          </a:xfrm>
-          <a:prstGeom prst="rect">
-            <a:avLst/>
-          </a:prstGeom>
-        </p:spPr>
-      </p:pic>
-      <p:sp>
-        <p:nvSpPr>
-          <p:cNvPr id="6" name="TextBox 5">
-            <a:extLst>
-              <a:ext uri="{FF2B5EF4-FFF2-40B4-BE49-F238E27FC236}">
-                <a16:creationId xmlns:a16="http://schemas.microsoft.com/office/drawing/2014/main" id="{078B58A5-039F-4D10-A008-8AE209FA8D83}"/>
-              </a:ext>
-            </a:extLst>
-          </p:cNvPr>
-          <p:cNvSpPr txBox="1"/>
-          <p:nvPr/>
-        </p:nvSpPr>
-        <p:spPr>
-          <a:xfrm>
-            <a:off x="661220" y="1784555"/>
-            <a:ext cx="10869560" cy="2906693"/>
-          </a:xfrm>
-          <a:prstGeom prst="rect">
-            <a:avLst/>
-          </a:prstGeom>
-          <a:noFill/>
-        </p:spPr>
-        <p:txBody>
-          <a:bodyPr wrap="square" rtlCol="0">
-            <a:spAutoFit/>
-          </a:bodyPr>
-          <a:lstStyle/>
-          <a:p>
-            <a:pPr algn="ctr">
-              <a:lnSpc>
-                <a:spcPct val="200000"/>
-              </a:lnSpc>
-            </a:pPr>
-            <a:r>
-              <a:rPr lang="en-US" sz="3200" dirty="0">
-                <a:latin typeface="open sans" panose="020B0606030504020204" pitchFamily="34" charset="0"/>
-                <a:ea typeface="open sans" panose="020B0606030504020204" pitchFamily="34" charset="0"/>
-                <a:cs typeface="open sans" panose="020B0606030504020204" pitchFamily="34" charset="0"/>
-              </a:rPr>
-              <a:t>Write 10 variable names under each of the datatypes that we have learnt so far. </a:t>
-            </a:r>
-          </a:p>
-          <a:p>
-            <a:pPr algn="ctr">
-              <a:lnSpc>
-                <a:spcPct val="200000"/>
-              </a:lnSpc>
-            </a:pPr>
-            <a:endParaRPr lang="en-US" sz="3200" dirty="0">
-              <a:latin typeface="open sans" panose="020B0606030504020204" pitchFamily="34" charset="0"/>
-              <a:ea typeface="open sans" panose="020B0606030504020204" pitchFamily="34" charset="0"/>
-              <a:cs typeface="open sans" panose="020B0606030504020204" pitchFamily="34" charset="0"/>
-            </a:endParaRPr>
-          </a:p>
-        </p:txBody>
-      </p:sp>
-      <p:sp>
-        <p:nvSpPr>
-          <p:cNvPr id="3" name="TextBox 2">
-            <a:extLst>
-              <a:ext uri="{FF2B5EF4-FFF2-40B4-BE49-F238E27FC236}">
-                <a16:creationId xmlns:a16="http://schemas.microsoft.com/office/drawing/2014/main" id="{873F191D-6411-48A4-906D-5706B06A685E}"/>
-              </a:ext>
-            </a:extLst>
-          </p:cNvPr>
-          <p:cNvSpPr txBox="1"/>
-          <p:nvPr/>
-        </p:nvSpPr>
-        <p:spPr>
-          <a:xfrm>
-            <a:off x="707617" y="5658534"/>
-            <a:ext cx="6819046" cy="646331"/>
-          </a:xfrm>
-          <a:prstGeom prst="rect">
-            <a:avLst/>
-          </a:prstGeom>
-          <a:noFill/>
-        </p:spPr>
-        <p:txBody>
-          <a:bodyPr wrap="none" rtlCol="0">
-            <a:spAutoFit/>
-          </a:bodyPr>
-          <a:lstStyle/>
-          <a:p>
-            <a:r>
-              <a:rPr lang="en-US" b="1" dirty="0">
-                <a:solidFill>
-                  <a:srgbClr val="FF0000"/>
-                </a:solidFill>
-              </a:rPr>
-              <a:t>NB: </a:t>
-            </a:r>
-            <a:r>
-              <a:rPr lang="en-US" sz="1800" b="1" dirty="0">
-                <a:latin typeface="open sans" panose="020B0606030504020204" pitchFamily="34" charset="0"/>
-                <a:ea typeface="open sans" panose="020B0606030504020204" pitchFamily="34" charset="0"/>
-                <a:cs typeface="open sans" panose="020B0606030504020204" pitchFamily="34" charset="0"/>
-              </a:rPr>
-              <a:t>Write variable names to fol</a:t>
-            </a:r>
-            <a:r>
-              <a:rPr lang="en-US" b="1" dirty="0">
-                <a:latin typeface="open sans" panose="020B0606030504020204" pitchFamily="34" charset="0"/>
-                <a:ea typeface="open sans" panose="020B0606030504020204" pitchFamily="34" charset="0"/>
-                <a:cs typeface="open sans" panose="020B0606030504020204" pitchFamily="34" charset="0"/>
-              </a:rPr>
-              <a:t>low given </a:t>
-            </a:r>
-            <a:r>
-              <a:rPr lang="en-US" sz="1800" b="1" dirty="0">
-                <a:latin typeface="open sans" panose="020B0606030504020204" pitchFamily="34" charset="0"/>
-                <a:ea typeface="open sans" panose="020B0606030504020204" pitchFamily="34" charset="0"/>
-                <a:cs typeface="open sans" panose="020B0606030504020204" pitchFamily="34" charset="0"/>
-              </a:rPr>
-              <a:t>rules in the slide</a:t>
-            </a:r>
-          </a:p>
-          <a:p>
-            <a:endParaRPr lang="en-US" b="1" dirty="0">
-              <a:solidFill>
-                <a:srgbClr val="FF0000"/>
-              </a:solidFill>
-            </a:endParaRPr>
-          </a:p>
-        </p:txBody>
-      </p:sp>
-    </p:spTree>
-    <p:extLst>
-      <p:ext uri="{BB962C8B-B14F-4D97-AF65-F5344CB8AC3E}">
-        <p14:creationId xmlns:p14="http://schemas.microsoft.com/office/powerpoint/2010/main" val="313063146"/>
       </p:ext>
     </p:extLst>
   </p:cSld>

</xml_diff>